<commit_message>
Final IoT presentation version.
</commit_message>
<xml_diff>
--- a/Privacy and Security in IoT/Privacy and Security in IoT.pptx
+++ b/Privacy and Security in IoT/Privacy and Security in IoT.pptx
@@ -218,7 +218,7 @@
           <a:p>
             <a:fld id="{51134203-2230-4A84-AF31-2F8A7817FD12}" type="datetimeFigureOut">
               <a:rPr lang="pt-PT" smtClean="0"/>
-              <a:t>18/09/2017</a:t>
+              <a:t>30/09/2017</a:t>
             </a:fld>
             <a:endParaRPr lang="pt-PT"/>
           </a:p>
@@ -635,7 +635,7 @@
           <a:p>
             <a:fld id="{B3DBB392-A060-44A1-8664-77BD121EF6D3}" type="datetime1">
               <a:rPr lang="pt-PT" smtClean="0"/>
-              <a:t>18/09/2017</a:t>
+              <a:t>30/09/2017</a:t>
             </a:fld>
             <a:endParaRPr lang="pt-PT"/>
           </a:p>
@@ -839,7 +839,7 @@
           <a:p>
             <a:fld id="{4DB539C0-F4B0-4500-99CE-CE71185F6FAF}" type="datetime1">
               <a:rPr lang="pt-PT" smtClean="0"/>
-              <a:t>18/09/2017</a:t>
+              <a:t>30/09/2017</a:t>
             </a:fld>
             <a:endParaRPr lang="pt-PT"/>
           </a:p>
@@ -1053,7 +1053,7 @@
           <a:p>
             <a:fld id="{66883551-F054-4802-B56B-CE45C7B2723B}" type="datetime1">
               <a:rPr lang="pt-PT" smtClean="0"/>
-              <a:t>18/09/2017</a:t>
+              <a:t>30/09/2017</a:t>
             </a:fld>
             <a:endParaRPr lang="pt-PT"/>
           </a:p>
@@ -1257,7 +1257,7 @@
           <a:p>
             <a:fld id="{D16BF49E-0DFF-405C-A518-CA3615F046EE}" type="datetime1">
               <a:rPr lang="pt-PT" smtClean="0"/>
-              <a:t>18/09/2017</a:t>
+              <a:t>30/09/2017</a:t>
             </a:fld>
             <a:endParaRPr lang="pt-PT"/>
           </a:p>
@@ -1537,7 +1537,7 @@
           <a:p>
             <a:fld id="{4CE6BD24-212A-4BB5-B9EC-E120423C308B}" type="datetime1">
               <a:rPr lang="pt-PT" smtClean="0"/>
-              <a:t>18/09/2017</a:t>
+              <a:t>30/09/2017</a:t>
             </a:fld>
             <a:endParaRPr lang="pt-PT"/>
           </a:p>
@@ -1809,7 +1809,7 @@
           <a:p>
             <a:fld id="{B8EEFFEB-8D5B-413A-A820-DD4843C912E4}" type="datetime1">
               <a:rPr lang="pt-PT" smtClean="0"/>
-              <a:t>18/09/2017</a:t>
+              <a:t>30/09/2017</a:t>
             </a:fld>
             <a:endParaRPr lang="pt-PT"/>
           </a:p>
@@ -2228,7 +2228,7 @@
           <a:p>
             <a:fld id="{D02D78FA-59E1-4583-A9BE-3C3B01BB3971}" type="datetime1">
               <a:rPr lang="pt-PT" smtClean="0"/>
-              <a:t>18/09/2017</a:t>
+              <a:t>30/09/2017</a:t>
             </a:fld>
             <a:endParaRPr lang="pt-PT"/>
           </a:p>
@@ -2374,7 +2374,7 @@
           <a:p>
             <a:fld id="{8CF84EB1-1808-40E8-8072-F6564AE422FB}" type="datetime1">
               <a:rPr lang="pt-PT" smtClean="0"/>
-              <a:t>18/09/2017</a:t>
+              <a:t>30/09/2017</a:t>
             </a:fld>
             <a:endParaRPr lang="pt-PT"/>
           </a:p>
@@ -2491,7 +2491,7 @@
           <a:p>
             <a:fld id="{AC8E04D4-9FF3-4140-9A3D-9C8466CAF7C2}" type="datetime1">
               <a:rPr lang="pt-PT" smtClean="0"/>
-              <a:t>18/09/2017</a:t>
+              <a:t>30/09/2017</a:t>
             </a:fld>
             <a:endParaRPr lang="pt-PT"/>
           </a:p>
@@ -2808,7 +2808,7 @@
           <a:p>
             <a:fld id="{62F66C97-DAE5-4F9F-889D-0FA794D8A750}" type="datetime1">
               <a:rPr lang="pt-PT" smtClean="0"/>
-              <a:t>18/09/2017</a:t>
+              <a:t>30/09/2017</a:t>
             </a:fld>
             <a:endParaRPr lang="pt-PT"/>
           </a:p>
@@ -3101,7 +3101,7 @@
           <a:p>
             <a:fld id="{B1448018-2074-4A0C-85A3-DB01CA563391}" type="datetime1">
               <a:rPr lang="pt-PT" smtClean="0"/>
-              <a:t>18/09/2017</a:t>
+              <a:t>30/09/2017</a:t>
             </a:fld>
             <a:endParaRPr lang="pt-PT"/>
           </a:p>
@@ -3348,7 +3348,7 @@
           <a:p>
             <a:fld id="{5A72DA14-4C6C-4A76-909C-7C5F77CECA35}" type="datetime1">
               <a:rPr lang="pt-PT" smtClean="0"/>
-              <a:t>18/09/2017</a:t>
+              <a:t>30/09/2017</a:t>
             </a:fld>
             <a:endParaRPr lang="pt-PT"/>
           </a:p>
@@ -4296,7 +4296,7 @@
         <p:spPr>
           <a:xfrm>
             <a:off x="838200" y="1825625"/>
-            <a:ext cx="10515600" cy="4351338"/>
+            <a:ext cx="7567569" cy="4351338"/>
           </a:xfrm>
         </p:spPr>
         <p:txBody>
@@ -4434,6 +4434,42 @@
           </a:p>
         </p:txBody>
       </p:sp>
+      <p:pic>
+        <p:nvPicPr>
+          <p:cNvPr id="8" name="Picture 7" descr="A close up of a speaker&#10;&#10;Description generated with very high confidence">
+            <a:extLst>
+              <a:ext uri="{FF2B5EF4-FFF2-40B4-BE49-F238E27FC236}">
+                <a16:creationId xmlns:a16="http://schemas.microsoft.com/office/drawing/2014/main" id="{99C49B81-711D-4CB7-AD2E-C0E961E1580D}"/>
+              </a:ext>
+            </a:extLst>
+          </p:cNvPr>
+          <p:cNvPicPr>
+            <a:picLocks noChangeAspect="1"/>
+          </p:cNvPicPr>
+          <p:nvPr/>
+        </p:nvPicPr>
+        <p:blipFill>
+          <a:blip r:embed="rId2">
+            <a:extLst>
+              <a:ext uri="{28A0092B-C50C-407E-A947-70E740481C1C}">
+                <a14:useLocalDpi xmlns:a14="http://schemas.microsoft.com/office/drawing/2010/main" val="0"/>
+              </a:ext>
+            </a:extLst>
+          </a:blip>
+          <a:stretch>
+            <a:fillRect/>
+          </a:stretch>
+        </p:blipFill>
+        <p:spPr>
+          <a:xfrm>
+            <a:off x="8766495" y="1654891"/>
+            <a:ext cx="2833359" cy="3777813"/>
+          </a:xfrm>
+          <a:prstGeom prst="rect">
+            <a:avLst/>
+          </a:prstGeom>
+        </p:spPr>
+      </p:pic>
     </p:spTree>
     <p:extLst>
       <p:ext uri="{BB962C8B-B14F-4D97-AF65-F5344CB8AC3E}">
@@ -4517,12 +4553,12 @@
         <p:spPr>
           <a:xfrm>
             <a:off x="838200" y="1825625"/>
-            <a:ext cx="10515600" cy="4351338"/>
+            <a:ext cx="7315200" cy="4351338"/>
           </a:xfrm>
         </p:spPr>
         <p:txBody>
           <a:bodyPr>
-            <a:normAutofit/>
+            <a:normAutofit lnSpcReduction="10000"/>
           </a:bodyPr>
           <a:lstStyle/>
           <a:p>
@@ -4557,12 +4593,6 @@
               <a:rPr lang="pt-PT" dirty="0"/>
               <a:t>Remote management was left enabled for the world at large.</a:t>
             </a:r>
-          </a:p>
-          <a:p>
-            <a:pPr marL="0" indent="0">
-              <a:buNone/>
-            </a:pPr>
-            <a:endParaRPr lang="pt-PT" dirty="0"/>
           </a:p>
           <a:p>
             <a:pPr marL="0" indent="0">
@@ -4672,6 +4702,76 @@
             <a:r>
               <a:rPr lang="pt-PT" sz="1500" dirty="0"/>
               <a:t>http://securityaffairs.co/wordpress/53871/iot/deutsche-telekom-hack.html</a:t>
+            </a:r>
+          </a:p>
+        </p:txBody>
+      </p:sp>
+      <p:pic>
+        <p:nvPicPr>
+          <p:cNvPr id="5" name="Picture 4">
+            <a:extLst>
+              <a:ext uri="{FF2B5EF4-FFF2-40B4-BE49-F238E27FC236}">
+                <a16:creationId xmlns:a16="http://schemas.microsoft.com/office/drawing/2014/main" id="{51A35794-9322-461D-B138-F8C8A0C0DF23}"/>
+              </a:ext>
+            </a:extLst>
+          </p:cNvPr>
+          <p:cNvPicPr>
+            <a:picLocks noChangeAspect="1"/>
+          </p:cNvPicPr>
+          <p:nvPr/>
+        </p:nvPicPr>
+        <p:blipFill rotWithShape="1">
+          <a:blip r:embed="rId2">
+            <a:extLst>
+              <a:ext uri="{28A0092B-C50C-407E-A947-70E740481C1C}">
+                <a14:useLocalDpi xmlns:a14="http://schemas.microsoft.com/office/drawing/2010/main" val="0"/>
+              </a:ext>
+            </a:extLst>
+          </a:blip>
+          <a:srcRect l="23016" r="22047"/>
+          <a:stretch/>
+        </p:blipFill>
+        <p:spPr>
+          <a:xfrm>
+            <a:off x="8263155" y="2017859"/>
+            <a:ext cx="3171039" cy="3676650"/>
+          </a:xfrm>
+          <a:prstGeom prst="rect">
+            <a:avLst/>
+          </a:prstGeom>
+        </p:spPr>
+      </p:pic>
+      <p:sp>
+        <p:nvSpPr>
+          <p:cNvPr id="9" name="TextBox 8">
+            <a:extLst>
+              <a:ext uri="{FF2B5EF4-FFF2-40B4-BE49-F238E27FC236}">
+                <a16:creationId xmlns:a16="http://schemas.microsoft.com/office/drawing/2014/main" id="{182621AD-7B42-4925-BE9D-8FFB4CD68473}"/>
+              </a:ext>
+            </a:extLst>
+          </p:cNvPr>
+          <p:cNvSpPr txBox="1"/>
+          <p:nvPr/>
+        </p:nvSpPr>
+        <p:spPr>
+          <a:xfrm>
+            <a:off x="9406447" y="5647492"/>
+            <a:ext cx="2138727" cy="261610"/>
+          </a:xfrm>
+          <a:prstGeom prst="rect">
+            <a:avLst/>
+          </a:prstGeom>
+          <a:noFill/>
+        </p:spPr>
+        <p:txBody>
+          <a:bodyPr wrap="none" rtlCol="0">
+            <a:spAutoFit/>
+          </a:bodyPr>
+          <a:lstStyle/>
+          <a:p>
+            <a:r>
+              <a:rPr lang="pt-PT" sz="1100" dirty="0"/>
+              <a:t>Allestoerungen.de and OpenMaps</a:t>
             </a:r>
           </a:p>
         </p:txBody>
@@ -4753,7 +4853,7 @@
         <p:spPr>
           <a:xfrm>
             <a:off x="838200" y="1825625"/>
-            <a:ext cx="10515600" cy="4351338"/>
+            <a:ext cx="6879672" cy="4351338"/>
           </a:xfrm>
         </p:spPr>
         <p:txBody>
@@ -4885,6 +4985,76 @@
             <a:r>
               <a:rPr lang="pt-PT" sz="1500" dirty="0"/>
               <a:t>https://www.wired.com/2015/07/hackers-remotely-kill-jeep-highway/</a:t>
+            </a:r>
+          </a:p>
+        </p:txBody>
+      </p:sp>
+      <p:pic>
+        <p:nvPicPr>
+          <p:cNvPr id="8" name="Picture 7" descr="A car parked in a grassy field&#10;&#10;Description generated with very high confidence">
+            <a:extLst>
+              <a:ext uri="{FF2B5EF4-FFF2-40B4-BE49-F238E27FC236}">
+                <a16:creationId xmlns:a16="http://schemas.microsoft.com/office/drawing/2014/main" id="{7385D8A9-DD9B-4DC7-BB59-000DA0F48FBB}"/>
+              </a:ext>
+            </a:extLst>
+          </p:cNvPr>
+          <p:cNvPicPr>
+            <a:picLocks noChangeAspect="1"/>
+          </p:cNvPicPr>
+          <p:nvPr/>
+        </p:nvPicPr>
+        <p:blipFill rotWithShape="1">
+          <a:blip r:embed="rId2">
+            <a:extLst>
+              <a:ext uri="{28A0092B-C50C-407E-A947-70E740481C1C}">
+                <a14:useLocalDpi xmlns:a14="http://schemas.microsoft.com/office/drawing/2010/main" val="0"/>
+              </a:ext>
+            </a:extLst>
+          </a:blip>
+          <a:srcRect l="15952" t="-1104" r="13741" b="1104"/>
+          <a:stretch/>
+        </p:blipFill>
+        <p:spPr>
+          <a:xfrm>
+            <a:off x="7891548" y="1825625"/>
+            <a:ext cx="3562699" cy="3800475"/>
+          </a:xfrm>
+          <a:prstGeom prst="rect">
+            <a:avLst/>
+          </a:prstGeom>
+        </p:spPr>
+      </p:pic>
+      <p:sp>
+        <p:nvSpPr>
+          <p:cNvPr id="9" name="TextBox 8">
+            <a:extLst>
+              <a:ext uri="{FF2B5EF4-FFF2-40B4-BE49-F238E27FC236}">
+                <a16:creationId xmlns:a16="http://schemas.microsoft.com/office/drawing/2014/main" id="{C4F47A6B-4D44-4B9F-AFDD-6307792C2D77}"/>
+              </a:ext>
+            </a:extLst>
+          </p:cNvPr>
+          <p:cNvSpPr txBox="1"/>
+          <p:nvPr/>
+        </p:nvSpPr>
+        <p:spPr>
+          <a:xfrm>
+            <a:off x="9965422" y="5592544"/>
+            <a:ext cx="1593706" cy="261610"/>
+          </a:xfrm>
+          <a:prstGeom prst="rect">
+            <a:avLst/>
+          </a:prstGeom>
+          <a:noFill/>
+        </p:spPr>
+        <p:txBody>
+          <a:bodyPr wrap="none" rtlCol="0">
+            <a:spAutoFit/>
+          </a:bodyPr>
+          <a:lstStyle/>
+          <a:p>
+            <a:r>
+              <a:rPr lang="pt-PT" sz="1100" dirty="0"/>
+              <a:t>Andy Greenberg / Wired</a:t>
             </a:r>
           </a:p>
         </p:txBody>

</xml_diff>

<commit_message>
Updated the presentation for 2018 meetup at Code Nomads.
</commit_message>
<xml_diff>
--- a/Privacy and Security in IoT/Privacy and Security in IoT.pptx
+++ b/Privacy and Security in IoT/Privacy and Security in IoT.pptx
@@ -22,9 +22,9 @@
     <p:sldId id="261" r:id="rId13"/>
     <p:sldId id="260" r:id="rId14"/>
     <p:sldId id="262" r:id="rId15"/>
-    <p:sldId id="263" r:id="rId16"/>
-    <p:sldId id="274" r:id="rId17"/>
-    <p:sldId id="273" r:id="rId18"/>
+    <p:sldId id="276" r:id="rId16"/>
+    <p:sldId id="263" r:id="rId17"/>
+    <p:sldId id="274" r:id="rId18"/>
     <p:sldId id="275" r:id="rId19"/>
   </p:sldIdLst>
   <p:sldSz cx="12192000" cy="6858000"/>
@@ -132,10 +132,6 @@
 </p:presentation>
 </file>
 
-<file path=ppt/revisionInfo.xml><?xml version="1.0" encoding="utf-8"?>
-<p1510:revInfo xmlns:a="http://schemas.openxmlformats.org/drawingml/2006/main" xmlns:r="http://schemas.openxmlformats.org/officeDocument/2006/relationships" xmlns:p1510="http://schemas.microsoft.com/office/powerpoint/2015/10/main"/>
-</file>
-
 <file path=ppt/notesMasters/notesMaster1.xml><?xml version="1.0" encoding="utf-8"?>
 <p:notesMaster xmlns:a="http://schemas.openxmlformats.org/drawingml/2006/main" xmlns:r="http://schemas.openxmlformats.org/officeDocument/2006/relationships" xmlns:p="http://schemas.openxmlformats.org/presentationml/2006/main">
   <p:cSld>
@@ -218,7 +214,7 @@
           <a:p>
             <a:fld id="{51134203-2230-4A84-AF31-2F8A7817FD12}" type="datetimeFigureOut">
               <a:rPr lang="pt-PT" smtClean="0"/>
-              <a:t>30/09/2017</a:t>
+              <a:t>16/09/2018</a:t>
             </a:fld>
             <a:endParaRPr lang="pt-PT"/>
           </a:p>
@@ -633,9 +629,9 @@
           <a:bodyPr/>
           <a:lstStyle/>
           <a:p>
-            <a:fld id="{B3DBB392-A060-44A1-8664-77BD121EF6D3}" type="datetime1">
+            <a:fld id="{083AC297-FFA4-422B-A626-7A9ECF5E8839}" type="datetime1">
               <a:rPr lang="pt-PT" smtClean="0"/>
-              <a:t>30/09/2017</a:t>
+              <a:t>16/09/2018</a:t>
             </a:fld>
             <a:endParaRPr lang="pt-PT"/>
           </a:p>
@@ -837,9 +833,9 @@
           <a:bodyPr/>
           <a:lstStyle/>
           <a:p>
-            <a:fld id="{4DB539C0-F4B0-4500-99CE-CE71185F6FAF}" type="datetime1">
+            <a:fld id="{B960973E-61AF-4372-9688-7274CFF52FF3}" type="datetime1">
               <a:rPr lang="pt-PT" smtClean="0"/>
-              <a:t>30/09/2017</a:t>
+              <a:t>16/09/2018</a:t>
             </a:fld>
             <a:endParaRPr lang="pt-PT"/>
           </a:p>
@@ -1051,9 +1047,9 @@
           <a:bodyPr/>
           <a:lstStyle/>
           <a:p>
-            <a:fld id="{66883551-F054-4802-B56B-CE45C7B2723B}" type="datetime1">
+            <a:fld id="{D778C2A9-7C07-4C30-A420-D4C15863C4B9}" type="datetime1">
               <a:rPr lang="pt-PT" smtClean="0"/>
-              <a:t>30/09/2017</a:t>
+              <a:t>16/09/2018</a:t>
             </a:fld>
             <a:endParaRPr lang="pt-PT"/>
           </a:p>
@@ -1255,9 +1251,9 @@
           <a:bodyPr/>
           <a:lstStyle/>
           <a:p>
-            <a:fld id="{D16BF49E-0DFF-405C-A518-CA3615F046EE}" type="datetime1">
+            <a:fld id="{04CC2EA4-E783-4A39-A962-7959B4F36201}" type="datetime1">
               <a:rPr lang="pt-PT" smtClean="0"/>
-              <a:t>30/09/2017</a:t>
+              <a:t>16/09/2018</a:t>
             </a:fld>
             <a:endParaRPr lang="pt-PT"/>
           </a:p>
@@ -1535,9 +1531,9 @@
           <a:bodyPr/>
           <a:lstStyle/>
           <a:p>
-            <a:fld id="{4CE6BD24-212A-4BB5-B9EC-E120423C308B}" type="datetime1">
+            <a:fld id="{A25CC86C-7AA2-4493-B1BD-D9D0583EE32F}" type="datetime1">
               <a:rPr lang="pt-PT" smtClean="0"/>
-              <a:t>30/09/2017</a:t>
+              <a:t>16/09/2018</a:t>
             </a:fld>
             <a:endParaRPr lang="pt-PT"/>
           </a:p>
@@ -1807,9 +1803,9 @@
           <a:bodyPr/>
           <a:lstStyle/>
           <a:p>
-            <a:fld id="{B8EEFFEB-8D5B-413A-A820-DD4843C912E4}" type="datetime1">
+            <a:fld id="{7DF29FDF-4163-4129-8723-55C85189D276}" type="datetime1">
               <a:rPr lang="pt-PT" smtClean="0"/>
-              <a:t>30/09/2017</a:t>
+              <a:t>16/09/2018</a:t>
             </a:fld>
             <a:endParaRPr lang="pt-PT"/>
           </a:p>
@@ -2226,9 +2222,9 @@
           <a:bodyPr/>
           <a:lstStyle/>
           <a:p>
-            <a:fld id="{D02D78FA-59E1-4583-A9BE-3C3B01BB3971}" type="datetime1">
+            <a:fld id="{39E97CA8-7861-4611-9193-A17793F15C9B}" type="datetime1">
               <a:rPr lang="pt-PT" smtClean="0"/>
-              <a:t>30/09/2017</a:t>
+              <a:t>16/09/2018</a:t>
             </a:fld>
             <a:endParaRPr lang="pt-PT"/>
           </a:p>
@@ -2372,9 +2368,9 @@
           <a:bodyPr/>
           <a:lstStyle/>
           <a:p>
-            <a:fld id="{8CF84EB1-1808-40E8-8072-F6564AE422FB}" type="datetime1">
+            <a:fld id="{C74EFF7A-568E-444F-84AF-1278FF11EA25}" type="datetime1">
               <a:rPr lang="pt-PT" smtClean="0"/>
-              <a:t>30/09/2017</a:t>
+              <a:t>16/09/2018</a:t>
             </a:fld>
             <a:endParaRPr lang="pt-PT"/>
           </a:p>
@@ -2489,9 +2485,9 @@
           <a:bodyPr/>
           <a:lstStyle/>
           <a:p>
-            <a:fld id="{AC8E04D4-9FF3-4140-9A3D-9C8466CAF7C2}" type="datetime1">
+            <a:fld id="{D534B638-908E-410C-B6E6-C1EDF71121B8}" type="datetime1">
               <a:rPr lang="pt-PT" smtClean="0"/>
-              <a:t>30/09/2017</a:t>
+              <a:t>16/09/2018</a:t>
             </a:fld>
             <a:endParaRPr lang="pt-PT"/>
           </a:p>
@@ -2806,9 +2802,9 @@
           <a:bodyPr/>
           <a:lstStyle/>
           <a:p>
-            <a:fld id="{62F66C97-DAE5-4F9F-889D-0FA794D8A750}" type="datetime1">
+            <a:fld id="{5899F52E-2888-4ED7-9F41-6AD91B600685}" type="datetime1">
               <a:rPr lang="pt-PT" smtClean="0"/>
-              <a:t>30/09/2017</a:t>
+              <a:t>16/09/2018</a:t>
             </a:fld>
             <a:endParaRPr lang="pt-PT"/>
           </a:p>
@@ -3099,9 +3095,9 @@
           <a:bodyPr/>
           <a:lstStyle/>
           <a:p>
-            <a:fld id="{B1448018-2074-4A0C-85A3-DB01CA563391}" type="datetime1">
+            <a:fld id="{DAE0D599-9604-4682-A604-B82E5C5F1316}" type="datetime1">
               <a:rPr lang="pt-PT" smtClean="0"/>
-              <a:t>30/09/2017</a:t>
+              <a:t>16/09/2018</a:t>
             </a:fld>
             <a:endParaRPr lang="pt-PT"/>
           </a:p>
@@ -3346,9 +3342,9 @@
             </a:lvl1pPr>
           </a:lstStyle>
           <a:p>
-            <a:fld id="{5A72DA14-4C6C-4A76-909C-7C5F77CECA35}" type="datetime1">
+            <a:fld id="{07C6C64D-4620-4D38-BDEF-43ED2D431370}" type="datetime1">
               <a:rPr lang="pt-PT" smtClean="0"/>
-              <a:t>30/09/2017</a:t>
+              <a:t>16/09/2018</a:t>
             </a:fld>
             <a:endParaRPr lang="pt-PT"/>
           </a:p>
@@ -3469,7 +3465,7 @@
     <p:sldLayoutId id="2147483658" r:id="rId10"/>
     <p:sldLayoutId id="2147483659" r:id="rId11"/>
   </p:sldLayoutIdLst>
-  <p:hf hdr="0" dt="0"/>
+  <p:hf hdr="0" ftr="0" dt="0"/>
   <p:txStyles>
     <p:titleStyle>
       <a:lvl1pPr algn="l" defTabSz="914400" rtl="0" eaLnBrk="1" latinLnBrk="0" hangingPunct="1">
@@ -3820,10 +3816,7 @@
           <a:bodyPr/>
           <a:lstStyle/>
           <a:p>
-            <a:r>
-              <a:rPr lang="pt-PT" dirty="0"/>
-              <a:t>Pixels Camp 2017</a:t>
-            </a:r>
+            <a:endParaRPr lang="pt-PT" dirty="0"/>
           </a:p>
         </p:txBody>
       </p:sp>
@@ -3976,35 +3969,6 @@
       </p:sp>
       <p:sp>
         <p:nvSpPr>
-          <p:cNvPr id="4" name="Footer Placeholder 3">
-            <a:extLst>
-              <a:ext uri="{FF2B5EF4-FFF2-40B4-BE49-F238E27FC236}">
-                <a16:creationId xmlns:a16="http://schemas.microsoft.com/office/drawing/2014/main" id="{8BA9C59A-6F71-4E5F-9C70-CE7C98137E3F}"/>
-              </a:ext>
-            </a:extLst>
-          </p:cNvPr>
-          <p:cNvSpPr>
-            <a:spLocks noGrp="1"/>
-          </p:cNvSpPr>
-          <p:nvPr>
-            <p:ph type="ftr" sz="quarter" idx="11"/>
-          </p:nvPr>
-        </p:nvSpPr>
-        <p:spPr/>
-        <p:txBody>
-          <a:bodyPr/>
-          <a:lstStyle/>
-          <a:p>
-            <a:r>
-              <a:rPr lang="en-GB"/>
-              <a:t>Privacy and Security in IoT - Pixels Camp 2017</a:t>
-            </a:r>
-            <a:endParaRPr lang="pt-PT"/>
-          </a:p>
-        </p:txBody>
-      </p:sp>
-      <p:sp>
-        <p:nvSpPr>
           <p:cNvPr id="5" name="Slide Number Placeholder 4">
             <a:extLst>
               <a:ext uri="{FF2B5EF4-FFF2-40B4-BE49-F238E27FC236}">
@@ -4163,35 +4127,6 @@
       </p:sp>
       <p:sp>
         <p:nvSpPr>
-          <p:cNvPr id="4" name="Footer Placeholder 3">
-            <a:extLst>
-              <a:ext uri="{FF2B5EF4-FFF2-40B4-BE49-F238E27FC236}">
-                <a16:creationId xmlns:a16="http://schemas.microsoft.com/office/drawing/2014/main" id="{4982C381-793A-4BE0-B386-6423F7DBCDC0}"/>
-              </a:ext>
-            </a:extLst>
-          </p:cNvPr>
-          <p:cNvSpPr>
-            <a:spLocks noGrp="1"/>
-          </p:cNvSpPr>
-          <p:nvPr>
-            <p:ph type="ftr" sz="quarter" idx="11"/>
-          </p:nvPr>
-        </p:nvSpPr>
-        <p:spPr/>
-        <p:txBody>
-          <a:bodyPr/>
-          <a:lstStyle/>
-          <a:p>
-            <a:r>
-              <a:rPr lang="en-GB"/>
-              <a:t>Privacy and Security in IoT - Pixels Camp 2017</a:t>
-            </a:r>
-            <a:endParaRPr lang="pt-PT"/>
-          </a:p>
-        </p:txBody>
-      </p:sp>
-      <p:sp>
-        <p:nvSpPr>
           <p:cNvPr id="5" name="Slide Number Placeholder 4">
             <a:extLst>
               <a:ext uri="{FF2B5EF4-FFF2-40B4-BE49-F238E27FC236}">
@@ -4295,8 +4230,8 @@
         </p:nvSpPr>
         <p:spPr>
           <a:xfrm>
-            <a:off x="838200" y="1825625"/>
-            <a:ext cx="7567569" cy="4351338"/>
+            <a:off x="838201" y="1825625"/>
+            <a:ext cx="7318924" cy="4351338"/>
           </a:xfrm>
         </p:spPr>
         <p:txBody>
@@ -4307,9 +4242,26 @@
               <a:buNone/>
             </a:pPr>
             <a:r>
+              <a:rPr lang="pt-PT" sz="4000" b="1" dirty="0" err="1"/>
+              <a:t>Belkin's</a:t>
+            </a:r>
+            <a:r>
               <a:rPr lang="pt-PT" sz="4000" b="1" dirty="0"/>
-              <a:t>120k IP cameras at risk of attack</a:t>
-            </a:r>
+              <a:t> </a:t>
+            </a:r>
+            <a:r>
+              <a:rPr lang="pt-PT" sz="4000" b="1" dirty="0" err="1"/>
+              <a:t>Wemo</a:t>
+            </a:r>
+            <a:r>
+              <a:rPr lang="pt-PT" sz="4000" b="1" dirty="0"/>
+              <a:t> Insight </a:t>
+            </a:r>
+            <a:r>
+              <a:rPr lang="pt-PT" sz="4000" b="1" dirty="0" err="1"/>
+              <a:t>smartplugs</a:t>
+            </a:r>
+            <a:endParaRPr lang="pt-PT" sz="4000" b="1" dirty="0"/>
           </a:p>
           <a:p>
             <a:pPr marL="0" indent="0">
@@ -4317,7 +4269,15 @@
             </a:pPr>
             <a:r>
               <a:rPr lang="pt-PT" dirty="0"/>
-              <a:t>(September 2017)</a:t>
+              <a:t>(</a:t>
+            </a:r>
+            <a:r>
+              <a:rPr lang="pt-PT" dirty="0" err="1"/>
+              <a:t>August</a:t>
+            </a:r>
+            <a:r>
+              <a:rPr lang="pt-PT" dirty="0"/>
+              <a:t> 2018)</a:t>
             </a:r>
           </a:p>
           <a:p>
@@ -4331,42 +4291,10 @@
               <a:buNone/>
             </a:pPr>
             <a:r>
-              <a:rPr lang="pt-PT" i="1" dirty="0"/>
-              <a:t>Persirai</a:t>
-            </a:r>
-            <a:r>
-              <a:rPr lang="pt-PT" dirty="0"/>
-              <a:t> leverages a zero-day vulnerability to gain access and UPnP to connect to the device.</a:t>
-            </a:r>
-          </a:p>
-        </p:txBody>
-      </p:sp>
-      <p:sp>
-        <p:nvSpPr>
-          <p:cNvPr id="4" name="Footer Placeholder 3">
-            <a:extLst>
-              <a:ext uri="{FF2B5EF4-FFF2-40B4-BE49-F238E27FC236}">
-                <a16:creationId xmlns:a16="http://schemas.microsoft.com/office/drawing/2014/main" id="{B02A0975-1723-490D-BF03-6101A81D93FA}"/>
-              </a:ext>
-            </a:extLst>
-          </p:cNvPr>
-          <p:cNvSpPr>
-            <a:spLocks noGrp="1"/>
-          </p:cNvSpPr>
-          <p:nvPr>
-            <p:ph type="ftr" sz="quarter" idx="11"/>
-          </p:nvPr>
-        </p:nvSpPr>
-        <p:spPr/>
-        <p:txBody>
-          <a:bodyPr/>
-          <a:lstStyle/>
-          <a:p>
-            <a:r>
-              <a:rPr lang="en-GB"/>
-              <a:t>Privacy and Security in IoT - Pixels Camp 2017</a:t>
-            </a:r>
-            <a:endParaRPr lang="pt-PT"/>
+              <a:rPr lang="en-GB" dirty="0"/>
+              <a:t>The flaw would potentially allow an attacker to not only manipulate the plug itself, but also allow hopping to other devices connected to the same Wi-Fi home network.</a:t>
+            </a:r>
+            <a:endParaRPr lang="pt-PT" dirty="0"/>
           </a:p>
         </p:txBody>
       </p:sp>
@@ -4429,26 +4357,26 @@
           <a:p>
             <a:r>
               <a:rPr lang="pt-PT" sz="1500" dirty="0"/>
-              <a:t>https://www.darkreading.com/attacks-breaches/new-iot-botnet-discovered-120k-ip-cameras-at-risk-of-attack/d/d-id/1328839</a:t>
+              <a:t>https://securingtomorrow.mcafee.com/mcafee-labs/insight-into-home-automation-reveals-vulnerability-in-simple-iot-product/</a:t>
             </a:r>
           </a:p>
         </p:txBody>
       </p:sp>
       <p:pic>
         <p:nvPicPr>
-          <p:cNvPr id="8" name="Picture 7" descr="A close up of a speaker&#10;&#10;Description generated with very high confidence">
-            <a:extLst>
-              <a:ext uri="{FF2B5EF4-FFF2-40B4-BE49-F238E27FC236}">
-                <a16:creationId xmlns:a16="http://schemas.microsoft.com/office/drawing/2014/main" id="{99C49B81-711D-4CB7-AD2E-C0E961E1580D}"/>
+          <p:cNvPr id="3074" name="Picture 2" descr="Pull the plug">
+            <a:extLst>
+              <a:ext uri="{FF2B5EF4-FFF2-40B4-BE49-F238E27FC236}">
+                <a16:creationId xmlns:a16="http://schemas.microsoft.com/office/drawing/2014/main" id="{84AFF655-F023-41C1-BAB6-7039C5DCB481}"/>
               </a:ext>
             </a:extLst>
           </p:cNvPr>
           <p:cNvPicPr>
-            <a:picLocks noChangeAspect="1"/>
+            <a:picLocks noChangeAspect="1" noChangeArrowheads="1"/>
           </p:cNvPicPr>
           <p:nvPr/>
         </p:nvPicPr>
-        <p:blipFill>
+        <p:blipFill rotWithShape="1">
           <a:blip r:embed="rId2">
             <a:extLst>
               <a:ext uri="{28A0092B-C50C-407E-A947-70E740481C1C}">
@@ -4456,20 +4384,73 @@
               </a:ext>
             </a:extLst>
           </a:blip>
-          <a:stretch>
-            <a:fillRect/>
-          </a:stretch>
+          <a:srcRect l="13637" r="10434"/>
+          <a:stretch/>
         </p:blipFill>
-        <p:spPr>
+        <p:spPr bwMode="auto">
           <a:xfrm>
-            <a:off x="8766495" y="1654891"/>
-            <a:ext cx="2833359" cy="3777813"/>
+            <a:off x="8157124" y="2033587"/>
+            <a:ext cx="3196676" cy="2790825"/>
           </a:xfrm>
           <a:prstGeom prst="rect">
             <a:avLst/>
           </a:prstGeom>
+          <a:noFill/>
+          <a:extLst>
+            <a:ext uri="{909E8E84-426E-40DD-AFC4-6F175D3DCCD1}">
+              <a14:hiddenFill xmlns:a14="http://schemas.microsoft.com/office/drawing/2010/main">
+                <a:solidFill>
+                  <a:srgbClr val="FFFFFF"/>
+                </a:solidFill>
+              </a14:hiddenFill>
+            </a:ext>
+          </a:extLst>
         </p:spPr>
       </p:pic>
+      <p:sp>
+        <p:nvSpPr>
+          <p:cNvPr id="9" name="TextBox 8">
+            <a:extLst>
+              <a:ext uri="{FF2B5EF4-FFF2-40B4-BE49-F238E27FC236}">
+                <a16:creationId xmlns:a16="http://schemas.microsoft.com/office/drawing/2014/main" id="{B51BFDDB-E9E2-4D3A-B233-C4666D22A1AE}"/>
+              </a:ext>
+            </a:extLst>
+          </p:cNvPr>
+          <p:cNvSpPr txBox="1"/>
+          <p:nvPr/>
+        </p:nvSpPr>
+        <p:spPr>
+          <a:xfrm>
+            <a:off x="10457401" y="4826219"/>
+            <a:ext cx="896399" cy="261610"/>
+          </a:xfrm>
+          <a:prstGeom prst="rect">
+            <a:avLst/>
+          </a:prstGeom>
+          <a:noFill/>
+        </p:spPr>
+        <p:txBody>
+          <a:bodyPr wrap="none" rtlCol="0">
+            <a:spAutoFit/>
+          </a:bodyPr>
+          <a:lstStyle/>
+          <a:p>
+            <a:r>
+              <a:rPr lang="pt-PT" sz="1100" dirty="0" err="1"/>
+              <a:t>The</a:t>
+            </a:r>
+            <a:r>
+              <a:rPr lang="pt-PT" sz="1100" dirty="0"/>
+              <a:t> </a:t>
+            </a:r>
+            <a:r>
+              <a:rPr lang="pt-PT" sz="1100" dirty="0" err="1"/>
+              <a:t>Register</a:t>
+            </a:r>
+            <a:endParaRPr lang="pt-PT" sz="1100" dirty="0"/>
+          </a:p>
+        </p:txBody>
+      </p:sp>
     </p:spTree>
     <p:extLst>
       <p:ext uri="{BB962C8B-B14F-4D97-AF65-F5344CB8AC3E}">
@@ -4558,7 +4539,7 @@
         </p:spPr>
         <p:txBody>
           <a:bodyPr>
-            <a:normAutofit lnSpcReduction="10000"/>
+            <a:normAutofit/>
           </a:bodyPr>
           <a:lstStyle/>
           <a:p>
@@ -4566,9 +4547,26 @@
               <a:buNone/>
             </a:pPr>
             <a:r>
+              <a:rPr lang="pt-PT" sz="4300" b="1" dirty="0" err="1"/>
+              <a:t>Over</a:t>
+            </a:r>
+            <a:r>
               <a:rPr lang="pt-PT" sz="4300" b="1" dirty="0"/>
-              <a:t>Over 900k routers compromised in Germany</a:t>
-            </a:r>
+              <a:t> 500k routers </a:t>
+            </a:r>
+            <a:r>
+              <a:rPr lang="pt-PT" sz="4300" b="1" dirty="0" err="1"/>
+              <a:t>compromised</a:t>
+            </a:r>
+            <a:r>
+              <a:rPr lang="pt-PT" sz="4300" b="1" dirty="0"/>
+              <a:t> </a:t>
+            </a:r>
+            <a:r>
+              <a:rPr lang="pt-PT" sz="4300" b="1" dirty="0" err="1"/>
+              <a:t>worldwide</a:t>
+            </a:r>
+            <a:endParaRPr lang="pt-PT" sz="4300" b="1" dirty="0"/>
           </a:p>
           <a:p>
             <a:pPr marL="0" indent="0">
@@ -4576,7 +4574,15 @@
             </a:pPr>
             <a:r>
               <a:rPr lang="pt-PT" dirty="0"/>
-              <a:t>(November 2016)</a:t>
+              <a:t>(</a:t>
+            </a:r>
+            <a:r>
+              <a:rPr lang="pt-PT" dirty="0" err="1"/>
+              <a:t>June</a:t>
+            </a:r>
+            <a:r>
+              <a:rPr lang="pt-PT" dirty="0"/>
+              <a:t> 2018)</a:t>
             </a:r>
           </a:p>
           <a:p>
@@ -4590,8 +4596,44 @@
               <a:buNone/>
             </a:pPr>
             <a:r>
-              <a:rPr lang="pt-PT" dirty="0"/>
-              <a:t>Remote management was left enabled for the world at large.</a:t>
+              <a:rPr lang="pt-PT" dirty="0" err="1"/>
+              <a:t>Attack</a:t>
+            </a:r>
+            <a:r>
+              <a:rPr lang="pt-PT" dirty="0"/>
+              <a:t> </a:t>
+            </a:r>
+            <a:r>
+              <a:rPr lang="pt-PT" dirty="0" err="1"/>
+              <a:t>vector</a:t>
+            </a:r>
+            <a:r>
+              <a:rPr lang="pt-PT" dirty="0"/>
+              <a:t> </a:t>
+            </a:r>
+            <a:r>
+              <a:rPr lang="pt-PT" dirty="0" err="1"/>
+              <a:t>unknown</a:t>
+            </a:r>
+            <a:r>
+              <a:rPr lang="pt-PT" dirty="0"/>
+              <a:t> as </a:t>
+            </a:r>
+            <a:r>
+              <a:rPr lang="pt-PT" dirty="0" err="1"/>
+              <a:t>of</a:t>
+            </a:r>
+            <a:r>
+              <a:rPr lang="pt-PT" dirty="0"/>
+              <a:t> </a:t>
+            </a:r>
+            <a:r>
+              <a:rPr lang="pt-PT" dirty="0" err="1"/>
+              <a:t>June</a:t>
+            </a:r>
+            <a:r>
+              <a:rPr lang="pt-PT" dirty="0"/>
+              <a:t> 2018.</a:t>
             </a:r>
           </a:p>
           <a:p>
@@ -4599,46 +4641,117 @@
               <a:buNone/>
             </a:pPr>
             <a:r>
-              <a:rPr lang="pt-PT" dirty="0"/>
-              <a:t>A variant of the </a:t>
-            </a:r>
-            <a:r>
-              <a:rPr lang="pt-PT" i="1" dirty="0"/>
-              <a:t>Mirai</a:t>
-            </a:r>
-            <a:r>
-              <a:rPr lang="pt-PT" dirty="0"/>
-              <a:t> worm was busy using well known credentials to change the routers’ firmware.</a:t>
-            </a:r>
-          </a:p>
-        </p:txBody>
-      </p:sp>
-      <p:sp>
-        <p:nvSpPr>
-          <p:cNvPr id="6" name="Footer Placeholder 5">
-            <a:extLst>
-              <a:ext uri="{FF2B5EF4-FFF2-40B4-BE49-F238E27FC236}">
-                <a16:creationId xmlns:a16="http://schemas.microsoft.com/office/drawing/2014/main" id="{721485C7-1A0E-4B47-AB02-3CC17A64AD81}"/>
-              </a:ext>
-            </a:extLst>
-          </p:cNvPr>
-          <p:cNvSpPr>
-            <a:spLocks noGrp="1"/>
-          </p:cNvSpPr>
-          <p:nvPr>
-            <p:ph type="ftr" sz="quarter" idx="11"/>
-          </p:nvPr>
-        </p:nvSpPr>
-        <p:spPr/>
-        <p:txBody>
-          <a:bodyPr/>
-          <a:lstStyle/>
-          <a:p>
-            <a:r>
-              <a:rPr lang="en-GB"/>
-              <a:t>Privacy and Security in IoT - Pixels Camp 2017</a:t>
-            </a:r>
-            <a:endParaRPr lang="pt-PT"/>
+              <a:rPr lang="pt-PT" i="1" dirty="0" err="1"/>
+              <a:t>VPNFilter</a:t>
+            </a:r>
+            <a:r>
+              <a:rPr lang="pt-PT" dirty="0"/>
+              <a:t> </a:t>
+            </a:r>
+            <a:r>
+              <a:rPr lang="pt-PT" dirty="0" err="1"/>
+              <a:t>malware</a:t>
+            </a:r>
+            <a:r>
+              <a:rPr lang="pt-PT" dirty="0"/>
+              <a:t> can </a:t>
+            </a:r>
+            <a:r>
+              <a:rPr lang="pt-PT" dirty="0" err="1"/>
+              <a:t>sniff</a:t>
+            </a:r>
+            <a:r>
+              <a:rPr lang="pt-PT" dirty="0"/>
+              <a:t> </a:t>
+            </a:r>
+            <a:r>
+              <a:rPr lang="pt-PT" dirty="0" err="1"/>
+              <a:t>traffic</a:t>
+            </a:r>
+            <a:r>
+              <a:rPr lang="pt-PT" dirty="0"/>
+              <a:t>, </a:t>
+            </a:r>
+            <a:r>
+              <a:rPr lang="pt-PT" dirty="0" err="1"/>
+              <a:t>turn</a:t>
+            </a:r>
+            <a:r>
+              <a:rPr lang="pt-PT" dirty="0"/>
+              <a:t> </a:t>
+            </a:r>
+            <a:r>
+              <a:rPr lang="pt-PT" dirty="0" err="1"/>
+              <a:t>the</a:t>
+            </a:r>
+            <a:r>
+              <a:rPr lang="pt-PT" dirty="0"/>
+              <a:t> router </a:t>
+            </a:r>
+            <a:r>
+              <a:rPr lang="pt-PT" dirty="0" err="1"/>
+              <a:t>into</a:t>
+            </a:r>
+            <a:r>
+              <a:rPr lang="pt-PT" dirty="0"/>
+              <a:t> a </a:t>
+            </a:r>
+            <a:r>
+              <a:rPr lang="pt-PT" dirty="0" err="1"/>
+              <a:t>stepstone</a:t>
+            </a:r>
+            <a:r>
+              <a:rPr lang="pt-PT" dirty="0"/>
+              <a:t> for </a:t>
+            </a:r>
+            <a:r>
+              <a:rPr lang="pt-PT" dirty="0" err="1"/>
+              <a:t>its</a:t>
+            </a:r>
+            <a:r>
+              <a:rPr lang="pt-PT" dirty="0"/>
+              <a:t> </a:t>
+            </a:r>
+            <a:r>
+              <a:rPr lang="pt-PT" dirty="0" err="1"/>
+              <a:t>master’s</a:t>
+            </a:r>
+            <a:r>
+              <a:rPr lang="pt-PT" dirty="0"/>
+              <a:t> </a:t>
+            </a:r>
+            <a:r>
+              <a:rPr lang="pt-PT" dirty="0" err="1"/>
+              <a:t>connections</a:t>
+            </a:r>
+            <a:r>
+              <a:rPr lang="pt-PT" dirty="0"/>
+              <a:t>, </a:t>
+            </a:r>
+            <a:r>
+              <a:rPr lang="pt-PT" dirty="0" err="1"/>
+              <a:t>and</a:t>
+            </a:r>
+            <a:r>
+              <a:rPr lang="pt-PT" dirty="0"/>
+              <a:t> </a:t>
+            </a:r>
+            <a:r>
+              <a:rPr lang="pt-PT" dirty="0" err="1"/>
+              <a:t>brick</a:t>
+            </a:r>
+            <a:r>
+              <a:rPr lang="pt-PT" dirty="0"/>
+              <a:t> </a:t>
+            </a:r>
+            <a:r>
+              <a:rPr lang="pt-PT" dirty="0" err="1"/>
+              <a:t>it</a:t>
+            </a:r>
+            <a:r>
+              <a:rPr lang="pt-PT" dirty="0"/>
+              <a:t>.</a:t>
+            </a:r>
           </a:p>
         </p:txBody>
       </p:sp>
@@ -4686,7 +4799,7 @@
         <p:spPr>
           <a:xfrm>
             <a:off x="838200" y="5853798"/>
-            <a:ext cx="6080575" cy="323165"/>
+            <a:ext cx="10672281" cy="323165"/>
           </a:xfrm>
           <a:prstGeom prst="rect">
             <a:avLst/>
@@ -4701,26 +4814,26 @@
           <a:p>
             <a:r>
               <a:rPr lang="pt-PT" sz="1500" dirty="0"/>
-              <a:t>http://securityaffairs.co/wordpress/53871/iot/deutsche-telekom-hack.html</a:t>
+              <a:t>https://arstechnica.com/information-technology/2018/05/hackers-infect-500000-consumer-routers-all-over-the-world-with-malware/</a:t>
             </a:r>
           </a:p>
         </p:txBody>
       </p:sp>
       <p:pic>
         <p:nvPicPr>
-          <p:cNvPr id="5" name="Picture 4">
-            <a:extLst>
-              <a:ext uri="{FF2B5EF4-FFF2-40B4-BE49-F238E27FC236}">
-                <a16:creationId xmlns:a16="http://schemas.microsoft.com/office/drawing/2014/main" id="{51A35794-9322-461D-B138-F8C8A0C0DF23}"/>
+          <p:cNvPr id="2050" name="Picture 2" descr="https://3.bp.blogspot.com/-1OGddXBBf1s/WwTyd0k3szI/AAAAAAAAAgs/82oB9Lftark-aUd7aYp5WnpNcfiAvxKjwCLcBGAs/s640/image2.jpg">
+            <a:extLst>
+              <a:ext uri="{FF2B5EF4-FFF2-40B4-BE49-F238E27FC236}">
+                <a16:creationId xmlns:a16="http://schemas.microsoft.com/office/drawing/2014/main" id="{E9125B96-EE9E-45A8-B61B-031113424849}"/>
               </a:ext>
             </a:extLst>
           </p:cNvPr>
           <p:cNvPicPr>
-            <a:picLocks noChangeAspect="1"/>
+            <a:picLocks noChangeAspect="1" noChangeArrowheads="1"/>
           </p:cNvPicPr>
           <p:nvPr/>
         </p:nvPicPr>
-        <p:blipFill rotWithShape="1">
+        <p:blipFill>
           <a:blip r:embed="rId2">
             <a:extLst>
               <a:ext uri="{28A0092B-C50C-407E-A947-70E740481C1C}">
@@ -4728,54 +4841,31 @@
               </a:ext>
             </a:extLst>
           </a:blip>
-          <a:srcRect l="23016" r="22047"/>
-          <a:stretch/>
+          <a:srcRect/>
+          <a:stretch>
+            <a:fillRect/>
+          </a:stretch>
         </p:blipFill>
-        <p:spPr>
+        <p:spPr bwMode="auto">
           <a:xfrm>
-            <a:off x="8263155" y="2017859"/>
-            <a:ext cx="3171039" cy="3676650"/>
-          </a:xfrm>
-          <a:prstGeom prst="rect">
-            <a:avLst/>
-          </a:prstGeom>
-        </p:spPr>
-      </p:pic>
-      <p:sp>
-        <p:nvSpPr>
-          <p:cNvPr id="9" name="TextBox 8">
-            <a:extLst>
-              <a:ext uri="{FF2B5EF4-FFF2-40B4-BE49-F238E27FC236}">
-                <a16:creationId xmlns:a16="http://schemas.microsoft.com/office/drawing/2014/main" id="{182621AD-7B42-4925-BE9D-8FFB4CD68473}"/>
-              </a:ext>
-            </a:extLst>
-          </p:cNvPr>
-          <p:cNvSpPr txBox="1"/>
-          <p:nvPr/>
-        </p:nvSpPr>
-        <p:spPr>
-          <a:xfrm>
-            <a:off x="9406447" y="5647492"/>
-            <a:ext cx="2138727" cy="261610"/>
+            <a:off x="6920918" y="1870075"/>
+            <a:ext cx="4589564" cy="1455752"/>
           </a:xfrm>
           <a:prstGeom prst="rect">
             <a:avLst/>
           </a:prstGeom>
           <a:noFill/>
+          <a:extLst>
+            <a:ext uri="{909E8E84-426E-40DD-AFC4-6F175D3DCCD1}">
+              <a14:hiddenFill xmlns:a14="http://schemas.microsoft.com/office/drawing/2010/main">
+                <a:solidFill>
+                  <a:srgbClr val="FFFFFF"/>
+                </a:solidFill>
+              </a14:hiddenFill>
+            </a:ext>
+          </a:extLst>
         </p:spPr>
-        <p:txBody>
-          <a:bodyPr wrap="none" rtlCol="0">
-            <a:spAutoFit/>
-          </a:bodyPr>
-          <a:lstStyle/>
-          <a:p>
-            <a:r>
-              <a:rPr lang="pt-PT" sz="1100" dirty="0"/>
-              <a:t>Allestoerungen.de and OpenMaps</a:t>
-            </a:r>
-          </a:p>
-        </p:txBody>
-      </p:sp>
+      </p:pic>
     </p:spTree>
     <p:extLst>
       <p:ext uri="{BB962C8B-B14F-4D97-AF65-F5344CB8AC3E}">
@@ -4898,35 +4988,6 @@
       </p:sp>
       <p:sp>
         <p:nvSpPr>
-          <p:cNvPr id="5" name="Footer Placeholder 4">
-            <a:extLst>
-              <a:ext uri="{FF2B5EF4-FFF2-40B4-BE49-F238E27FC236}">
-                <a16:creationId xmlns:a16="http://schemas.microsoft.com/office/drawing/2014/main" id="{5E287CCE-E137-43D7-AF1D-0EB164337F4F}"/>
-              </a:ext>
-            </a:extLst>
-          </p:cNvPr>
-          <p:cNvSpPr>
-            <a:spLocks noGrp="1"/>
-          </p:cNvSpPr>
-          <p:nvPr>
-            <p:ph type="ftr" sz="quarter" idx="11"/>
-          </p:nvPr>
-        </p:nvSpPr>
-        <p:spPr/>
-        <p:txBody>
-          <a:bodyPr/>
-          <a:lstStyle/>
-          <a:p>
-            <a:r>
-              <a:rPr lang="en-GB"/>
-              <a:t>Privacy and Security in IoT - Pixels Camp 2017</a:t>
-            </a:r>
-            <a:endParaRPr lang="pt-PT"/>
-          </a:p>
-        </p:txBody>
-      </p:sp>
-      <p:sp>
-        <p:nvSpPr>
           <p:cNvPr id="6" name="Slide Number Placeholder 5">
             <a:extLst>
               <a:ext uri="{FF2B5EF4-FFF2-40B4-BE49-F238E27FC236}">
@@ -5196,35 +5257,6 @@
       </p:sp>
       <p:sp>
         <p:nvSpPr>
-          <p:cNvPr id="4" name="Footer Placeholder 3">
-            <a:extLst>
-              <a:ext uri="{FF2B5EF4-FFF2-40B4-BE49-F238E27FC236}">
-                <a16:creationId xmlns:a16="http://schemas.microsoft.com/office/drawing/2014/main" id="{562CB49D-692B-4AAD-8360-ABDEB3A19086}"/>
-              </a:ext>
-            </a:extLst>
-          </p:cNvPr>
-          <p:cNvSpPr>
-            <a:spLocks noGrp="1"/>
-          </p:cNvSpPr>
-          <p:nvPr>
-            <p:ph type="ftr" sz="quarter" idx="11"/>
-          </p:nvPr>
-        </p:nvSpPr>
-        <p:spPr/>
-        <p:txBody>
-          <a:bodyPr/>
-          <a:lstStyle/>
-          <a:p>
-            <a:r>
-              <a:rPr lang="en-GB"/>
-              <a:t>Privacy and Security in IoT - Pixels Camp 2017</a:t>
-            </a:r>
-            <a:endParaRPr lang="pt-PT"/>
-          </a:p>
-        </p:txBody>
-      </p:sp>
-      <p:sp>
-        <p:nvSpPr>
           <p:cNvPr id="5" name="Slide Number Placeholder 4">
             <a:extLst>
               <a:ext uri="{FF2B5EF4-FFF2-40B4-BE49-F238E27FC236}">
@@ -5290,7 +5322,7 @@
     </p:spTree>
     <p:extLst>
       <p:ext uri="{BB962C8B-B14F-4D97-AF65-F5344CB8AC3E}">
-        <p14:creationId xmlns:p14="http://schemas.microsoft.com/office/powerpoint/2010/main" val="1576054474"/>
+        <p14:creationId xmlns:p14="http://schemas.microsoft.com/office/powerpoint/2010/main" val="3033974753"/>
       </p:ext>
     </p:extLst>
   </p:cSld>
@@ -5322,7 +5354,7 @@
           <p:cNvPr id="2" name="Title 1">
             <a:extLst>
               <a:ext uri="{FF2B5EF4-FFF2-40B4-BE49-F238E27FC236}">
-                <a16:creationId xmlns:a16="http://schemas.microsoft.com/office/drawing/2014/main" id="{68436796-0E34-4F23-B108-B431BB522468}"/>
+                <a16:creationId xmlns:a16="http://schemas.microsoft.com/office/drawing/2014/main" id="{C58704AF-3105-4E10-9E84-ADBC86A4C713}"/>
               </a:ext>
             </a:extLst>
           </p:cNvPr>
@@ -5334,6 +5366,59 @@
           </p:nvPr>
         </p:nvSpPr>
         <p:spPr/>
+        <p:txBody>
+          <a:bodyPr/>
+          <a:lstStyle/>
+          <a:p>
+            <a:r>
+              <a:rPr lang="pt-PT" dirty="0" err="1"/>
+              <a:t>Thinking</a:t>
+            </a:r>
+            <a:r>
+              <a:rPr lang="pt-PT" dirty="0"/>
+              <a:t> </a:t>
+            </a:r>
+            <a:r>
+              <a:rPr lang="pt-PT" dirty="0" err="1"/>
+              <a:t>about</a:t>
+            </a:r>
+            <a:r>
+              <a:rPr lang="pt-PT" dirty="0"/>
+              <a:t> </a:t>
+            </a:r>
+            <a:r>
+              <a:rPr lang="pt-PT" dirty="0" err="1"/>
+              <a:t>it</a:t>
+            </a:r>
+            <a:r>
+              <a:rPr lang="pt-PT" dirty="0"/>
+              <a:t>…</a:t>
+            </a:r>
+          </a:p>
+        </p:txBody>
+      </p:sp>
+      <p:sp>
+        <p:nvSpPr>
+          <p:cNvPr id="3" name="Content Placeholder 2">
+            <a:extLst>
+              <a:ext uri="{FF2B5EF4-FFF2-40B4-BE49-F238E27FC236}">
+                <a16:creationId xmlns:a16="http://schemas.microsoft.com/office/drawing/2014/main" id="{09D2F243-32D2-4010-8F7E-C32B3D978EF7}"/>
+              </a:ext>
+            </a:extLst>
+          </p:cNvPr>
+          <p:cNvSpPr>
+            <a:spLocks noGrp="1"/>
+          </p:cNvSpPr>
+          <p:nvPr>
+            <p:ph idx="1"/>
+          </p:nvPr>
+        </p:nvSpPr>
+        <p:spPr>
+          <a:xfrm>
+            <a:off x="838200" y="1825625"/>
+            <a:ext cx="10515600" cy="4351338"/>
+          </a:xfrm>
+        </p:spPr>
         <p:txBody>
           <a:bodyPr>
             <a:normAutofit/>
@@ -5342,129 +5427,76 @@
           <a:p>
             <a:r>
               <a:rPr lang="pt-PT" dirty="0"/>
-              <a:t>General Data Protection Regulation (EU)</a:t>
-            </a:r>
-          </a:p>
-        </p:txBody>
-      </p:sp>
-      <p:sp>
-        <p:nvSpPr>
-          <p:cNvPr id="3" name="Content Placeholder 2">
-            <a:extLst>
-              <a:ext uri="{FF2B5EF4-FFF2-40B4-BE49-F238E27FC236}">
-                <a16:creationId xmlns:a16="http://schemas.microsoft.com/office/drawing/2014/main" id="{6E517DA4-6FCC-4062-8FBE-5DB4DD793B2F}"/>
-              </a:ext>
-            </a:extLst>
-          </p:cNvPr>
-          <p:cNvSpPr>
-            <a:spLocks noGrp="1"/>
-          </p:cNvSpPr>
-          <p:nvPr>
-            <p:ph idx="1"/>
-          </p:nvPr>
-        </p:nvSpPr>
-        <p:spPr/>
-        <p:txBody>
-          <a:bodyPr>
-            <a:normAutofit/>
-          </a:bodyPr>
-          <a:lstStyle/>
-          <a:p>
-            <a:r>
-              <a:rPr lang="pt-PT" dirty="0"/>
-              <a:t>Privacy by design and by default!</a:t>
-            </a:r>
-          </a:p>
-          <a:p>
-            <a:pPr lvl="1"/>
-            <a:r>
-              <a:rPr lang="pt-PT" dirty="0"/>
-              <a:t>Minimize data collection.</a:t>
-            </a:r>
-          </a:p>
-          <a:p>
-            <a:pPr lvl="1"/>
-            <a:r>
-              <a:rPr lang="pt-PT" dirty="0"/>
-              <a:t>Hide data.</a:t>
-            </a:r>
-          </a:p>
-          <a:p>
-            <a:pPr lvl="2"/>
-            <a:r>
-              <a:rPr lang="pt-PT" dirty="0"/>
-              <a:t>Encrypt.</a:t>
-            </a:r>
-          </a:p>
-          <a:p>
-            <a:pPr lvl="2"/>
-            <a:r>
-              <a:rPr lang="pt-PT" dirty="0"/>
-              <a:t>Anonymize.</a:t>
-            </a:r>
-          </a:p>
-          <a:p>
-            <a:pPr lvl="2"/>
-            <a:r>
-              <a:rPr lang="pt-PT" dirty="0"/>
-              <a:t>Pseudonymize.</a:t>
-            </a:r>
-          </a:p>
-          <a:p>
-            <a:pPr lvl="1"/>
-            <a:r>
-              <a:rPr lang="pt-PT" dirty="0"/>
-              <a:t>Control access to data.</a:t>
-            </a:r>
-          </a:p>
-          <a:p>
-            <a:pPr lvl="1"/>
-            <a:endParaRPr lang="pt-PT" dirty="0"/>
-          </a:p>
-          <a:p>
-            <a:r>
-              <a:rPr lang="pt-PT" dirty="0"/>
-              <a:t>Have a privacy policy.</a:t>
-            </a:r>
-          </a:p>
-          <a:p>
-            <a:r>
-              <a:rPr lang="pt-PT" dirty="0"/>
-              <a:t>Have means of determining the extent of privacy braches.</a:t>
-            </a:r>
-          </a:p>
-          <a:p>
-            <a:pPr lvl="1"/>
-            <a:endParaRPr lang="pt-PT" dirty="0"/>
-          </a:p>
-        </p:txBody>
-      </p:sp>
-      <p:sp>
-        <p:nvSpPr>
-          <p:cNvPr id="4" name="Footer Placeholder 3">
-            <a:extLst>
-              <a:ext uri="{FF2B5EF4-FFF2-40B4-BE49-F238E27FC236}">
-                <a16:creationId xmlns:a16="http://schemas.microsoft.com/office/drawing/2014/main" id="{8C16EC0F-2B14-440A-8AC5-6859208E9C53}"/>
-              </a:ext>
-            </a:extLst>
-          </p:cNvPr>
-          <p:cNvSpPr>
-            <a:spLocks noGrp="1"/>
-          </p:cNvSpPr>
-          <p:nvPr>
-            <p:ph type="ftr" sz="quarter" idx="11"/>
-          </p:nvPr>
-        </p:nvSpPr>
-        <p:spPr/>
-        <p:txBody>
-          <a:bodyPr/>
-          <a:lstStyle/>
-          <a:p>
-            <a:r>
-              <a:rPr lang="en-GB"/>
-              <a:t>Privacy and Security in IoT - Pixels Camp 2017</a:t>
-            </a:r>
-            <a:endParaRPr lang="pt-PT"/>
+              <a:t>Philips </a:t>
+            </a:r>
+            <a:r>
+              <a:rPr lang="pt-PT" dirty="0" err="1"/>
+              <a:t>Hue</a:t>
+            </a:r>
+            <a:r>
+              <a:rPr lang="pt-PT" dirty="0"/>
+              <a:t> </a:t>
+            </a:r>
+            <a:r>
+              <a:rPr lang="pt-PT" dirty="0" err="1"/>
+              <a:t>lamps</a:t>
+            </a:r>
+            <a:r>
+              <a:rPr lang="pt-PT" dirty="0"/>
+              <a:t> </a:t>
+            </a:r>
+            <a:r>
+              <a:rPr lang="pt-PT" dirty="0" err="1"/>
+              <a:t>were</a:t>
+            </a:r>
+            <a:r>
+              <a:rPr lang="pt-PT" dirty="0"/>
+              <a:t> </a:t>
+            </a:r>
+            <a:r>
+              <a:rPr lang="pt-PT" dirty="0" err="1"/>
+              <a:t>exploited</a:t>
+            </a:r>
+            <a:r>
+              <a:rPr lang="pt-PT" dirty="0"/>
+              <a:t> </a:t>
+            </a:r>
+            <a:r>
+              <a:rPr lang="pt-PT" dirty="0" err="1"/>
+              <a:t>remotely</a:t>
+            </a:r>
+            <a:r>
+              <a:rPr lang="pt-PT" dirty="0"/>
+              <a:t> to </a:t>
+            </a:r>
+            <a:r>
+              <a:rPr lang="pt-PT" dirty="0" err="1"/>
+              <a:t>plant</a:t>
+            </a:r>
+            <a:r>
+              <a:rPr lang="pt-PT" dirty="0"/>
+              <a:t> a </a:t>
+            </a:r>
+            <a:r>
+              <a:rPr lang="pt-PT" dirty="0" err="1"/>
+              <a:t>worm</a:t>
+            </a:r>
+            <a:r>
+              <a:rPr lang="pt-PT" dirty="0"/>
+              <a:t>.</a:t>
+            </a:r>
+          </a:p>
+          <a:p>
+            <a:endParaRPr lang="en-GB" dirty="0"/>
+          </a:p>
+          <a:p>
+            <a:r>
+              <a:rPr lang="en-GB" dirty="0"/>
+              <a:t>An Internet of Things (IoT) botnet of high wattage devices may allow attacks on the power grid.</a:t>
+            </a:r>
+          </a:p>
+          <a:p>
+            <a:endParaRPr lang="en-GB" dirty="0"/>
           </a:p>
         </p:txBody>
       </p:sp>
@@ -5473,7 +5505,7 @@
           <p:cNvPr id="5" name="Slide Number Placeholder 4">
             <a:extLst>
               <a:ext uri="{FF2B5EF4-FFF2-40B4-BE49-F238E27FC236}">
-                <a16:creationId xmlns:a16="http://schemas.microsoft.com/office/drawing/2014/main" id="{C9828240-E6A9-4986-AFA8-F9644AD7BB62}"/>
+                <a16:creationId xmlns:a16="http://schemas.microsoft.com/office/drawing/2014/main" id="{99724153-A4B1-42B5-8B00-7BB9F6DF5790}"/>
               </a:ext>
             </a:extLst>
           </p:cNvPr>
@@ -5497,10 +5529,80 @@
           </a:p>
         </p:txBody>
       </p:sp>
+      <p:sp>
+        <p:nvSpPr>
+          <p:cNvPr id="7" name="TextBox 6">
+            <a:extLst>
+              <a:ext uri="{FF2B5EF4-FFF2-40B4-BE49-F238E27FC236}">
+                <a16:creationId xmlns:a16="http://schemas.microsoft.com/office/drawing/2014/main" id="{564A561B-92C8-4C47-816C-99866FEFBD5D}"/>
+              </a:ext>
+            </a:extLst>
+          </p:cNvPr>
+          <p:cNvSpPr txBox="1"/>
+          <p:nvPr/>
+        </p:nvSpPr>
+        <p:spPr>
+          <a:xfrm>
+            <a:off x="5364275" y="3606240"/>
+            <a:ext cx="5989525" cy="323165"/>
+          </a:xfrm>
+          <a:prstGeom prst="rect">
+            <a:avLst/>
+          </a:prstGeom>
+          <a:noFill/>
+        </p:spPr>
+        <p:txBody>
+          <a:bodyPr wrap="none" rtlCol="0">
+            <a:spAutoFit/>
+          </a:bodyPr>
+          <a:lstStyle/>
+          <a:p>
+            <a:r>
+              <a:rPr lang="pt-PT" sz="1500" dirty="0"/>
+              <a:t>https://www.usenix.org/conference/usenixsecurity18/presentation/soltan</a:t>
+            </a:r>
+          </a:p>
+        </p:txBody>
+      </p:sp>
+      <p:sp>
+        <p:nvSpPr>
+          <p:cNvPr id="8" name="TextBox 7">
+            <a:extLst>
+              <a:ext uri="{FF2B5EF4-FFF2-40B4-BE49-F238E27FC236}">
+                <a16:creationId xmlns:a16="http://schemas.microsoft.com/office/drawing/2014/main" id="{F2E793D6-05C3-466B-9758-4C2C97D7D200}"/>
+              </a:ext>
+            </a:extLst>
+          </p:cNvPr>
+          <p:cNvSpPr txBox="1"/>
+          <p:nvPr/>
+        </p:nvSpPr>
+        <p:spPr>
+          <a:xfrm>
+            <a:off x="4317065" y="2257830"/>
+            <a:ext cx="7036735" cy="323165"/>
+          </a:xfrm>
+          <a:prstGeom prst="rect">
+            <a:avLst/>
+          </a:prstGeom>
+          <a:noFill/>
+        </p:spPr>
+        <p:txBody>
+          <a:bodyPr wrap="none" rtlCol="0">
+            <a:spAutoFit/>
+          </a:bodyPr>
+          <a:lstStyle/>
+          <a:p>
+            <a:r>
+              <a:rPr lang="pt-PT" sz="1500" dirty="0"/>
+              <a:t>https://blog.acolyer.org/2017/06/22/iot-goes-nuclear-creating-a-zigbee-chain-reaction/</a:t>
+            </a:r>
+          </a:p>
+        </p:txBody>
+      </p:sp>
     </p:spTree>
     <p:extLst>
       <p:ext uri="{BB962C8B-B14F-4D97-AF65-F5344CB8AC3E}">
-        <p14:creationId xmlns:p14="http://schemas.microsoft.com/office/powerpoint/2010/main" val="18948827"/>
+        <p14:creationId xmlns:p14="http://schemas.microsoft.com/office/powerpoint/2010/main" val="1576054474"/>
       </p:ext>
     </p:extLst>
   </p:cSld>
@@ -5532,7 +5634,7 @@
           <p:cNvPr id="2" name="Title 1">
             <a:extLst>
               <a:ext uri="{FF2B5EF4-FFF2-40B4-BE49-F238E27FC236}">
-                <a16:creationId xmlns:a16="http://schemas.microsoft.com/office/drawing/2014/main" id="{1C462418-F919-4B78-83DE-2B92C8F782C7}"/>
+                <a16:creationId xmlns:a16="http://schemas.microsoft.com/office/drawing/2014/main" id="{68436796-0E34-4F23-B108-B431BB522468}"/>
               </a:ext>
             </a:extLst>
           </p:cNvPr>
@@ -5545,7 +5647,9 @@
         </p:nvSpPr>
         <p:spPr/>
         <p:txBody>
-          <a:bodyPr/>
+          <a:bodyPr>
+            <a:normAutofit/>
+          </a:bodyPr>
           <a:lstStyle/>
           <a:p>
             <a:r>
@@ -5560,7 +5664,7 @@
           <p:cNvPr id="3" name="Content Placeholder 2">
             <a:extLst>
               <a:ext uri="{FF2B5EF4-FFF2-40B4-BE49-F238E27FC236}">
-                <a16:creationId xmlns:a16="http://schemas.microsoft.com/office/drawing/2014/main" id="{EC3CD1E1-C97E-4961-B954-9C1C4958411F}"/>
+                <a16:creationId xmlns:a16="http://schemas.microsoft.com/office/drawing/2014/main" id="{6E517DA4-6FCC-4062-8FBE-5DB4DD793B2F}"/>
               </a:ext>
             </a:extLst>
           </p:cNvPr>
@@ -5573,91 +5677,77 @@
         </p:nvSpPr>
         <p:spPr/>
         <p:txBody>
-          <a:bodyPr/>
-          <a:lstStyle/>
-          <a:p>
-            <a:r>
-              <a:rPr lang="pt-PT" dirty="0"/>
-              <a:t>Data subjects have rights:</a:t>
+          <a:bodyPr>
+            <a:normAutofit/>
+          </a:bodyPr>
+          <a:lstStyle/>
+          <a:p>
+            <a:r>
+              <a:rPr lang="pt-PT" dirty="0"/>
+              <a:t>Privacy by design and by default!</a:t>
             </a:r>
           </a:p>
           <a:p>
             <a:pPr lvl="1"/>
             <a:r>
               <a:rPr lang="pt-PT" dirty="0"/>
-              <a:t>Information</a:t>
+              <a:t>Minimize data collection.</a:t>
             </a:r>
           </a:p>
           <a:p>
             <a:pPr lvl="1"/>
             <a:r>
               <a:rPr lang="pt-PT" dirty="0"/>
-              <a:t>Access</a:t>
+              <a:t>Hide data.</a:t>
+            </a:r>
+          </a:p>
+          <a:p>
+            <a:pPr lvl="2"/>
+            <a:r>
+              <a:rPr lang="pt-PT" dirty="0"/>
+              <a:t>Encrypt.</a:t>
+            </a:r>
+          </a:p>
+          <a:p>
+            <a:pPr lvl="2"/>
+            <a:r>
+              <a:rPr lang="pt-PT" dirty="0"/>
+              <a:t>Anonymize.</a:t>
+            </a:r>
+          </a:p>
+          <a:p>
+            <a:pPr lvl="2"/>
+            <a:r>
+              <a:rPr lang="pt-PT" dirty="0"/>
+              <a:t>Pseudonymize.</a:t>
             </a:r>
           </a:p>
           <a:p>
             <a:pPr lvl="1"/>
             <a:r>
               <a:rPr lang="pt-PT" dirty="0"/>
-              <a:t>Update</a:t>
+              <a:t>Control access to data.</a:t>
             </a:r>
           </a:p>
           <a:p>
             <a:pPr lvl="1"/>
-            <a:r>
-              <a:rPr lang="pt-PT" dirty="0"/>
-              <a:t>Object</a:t>
+            <a:endParaRPr lang="pt-PT" dirty="0"/>
+          </a:p>
+          <a:p>
+            <a:r>
+              <a:rPr lang="pt-PT" dirty="0"/>
+              <a:t>Have a privacy policy.</a:t>
+            </a:r>
+          </a:p>
+          <a:p>
+            <a:r>
+              <a:rPr lang="pt-PT" dirty="0"/>
+              <a:t>Have means of determining the extent of privacy braches.</a:t>
             </a:r>
           </a:p>
           <a:p>
             <a:pPr lvl="1"/>
-            <a:r>
-              <a:rPr lang="pt-PT" dirty="0"/>
-              <a:t>Erasure</a:t>
-            </a:r>
-          </a:p>
-          <a:p>
-            <a:pPr lvl="1"/>
-            <a:r>
-              <a:rPr lang="pt-PT" dirty="0"/>
-              <a:t>Export</a:t>
-            </a:r>
-          </a:p>
-          <a:p>
-            <a:pPr lvl="1"/>
-            <a:r>
-              <a:rPr lang="pt-PT" dirty="0"/>
-              <a:t>Portability</a:t>
-            </a:r>
-          </a:p>
-        </p:txBody>
-      </p:sp>
-      <p:sp>
-        <p:nvSpPr>
-          <p:cNvPr id="4" name="Footer Placeholder 3">
-            <a:extLst>
-              <a:ext uri="{FF2B5EF4-FFF2-40B4-BE49-F238E27FC236}">
-                <a16:creationId xmlns:a16="http://schemas.microsoft.com/office/drawing/2014/main" id="{C9152C18-2AF8-4563-ADD6-6110D60610A0}"/>
-              </a:ext>
-            </a:extLst>
-          </p:cNvPr>
-          <p:cNvSpPr>
-            <a:spLocks noGrp="1"/>
-          </p:cNvSpPr>
-          <p:nvPr>
-            <p:ph type="ftr" sz="quarter" idx="11"/>
-          </p:nvPr>
-        </p:nvSpPr>
-        <p:spPr/>
-        <p:txBody>
-          <a:bodyPr/>
-          <a:lstStyle/>
-          <a:p>
-            <a:r>
-              <a:rPr lang="en-GB"/>
-              <a:t>Privacy and Security in IoT - Pixels Camp 2017</a:t>
-            </a:r>
-            <a:endParaRPr lang="pt-PT"/>
+            <a:endParaRPr lang="pt-PT" dirty="0"/>
           </a:p>
         </p:txBody>
       </p:sp>
@@ -5666,7 +5756,7 @@
           <p:cNvPr id="5" name="Slide Number Placeholder 4">
             <a:extLst>
               <a:ext uri="{FF2B5EF4-FFF2-40B4-BE49-F238E27FC236}">
-                <a16:creationId xmlns:a16="http://schemas.microsoft.com/office/drawing/2014/main" id="{E56352E9-24E8-48C8-850F-0230EF184B2B}"/>
+                <a16:creationId xmlns:a16="http://schemas.microsoft.com/office/drawing/2014/main" id="{C9828240-E6A9-4986-AFA8-F9644AD7BB62}"/>
               </a:ext>
             </a:extLst>
           </p:cNvPr>
@@ -5693,7 +5783,7 @@
     </p:spTree>
     <p:extLst>
       <p:ext uri="{BB962C8B-B14F-4D97-AF65-F5344CB8AC3E}">
-        <p14:creationId xmlns:p14="http://schemas.microsoft.com/office/powerpoint/2010/main" val="3393750226"/>
+        <p14:creationId xmlns:p14="http://schemas.microsoft.com/office/powerpoint/2010/main" val="18948827"/>
       </p:ext>
     </p:extLst>
   </p:cSld>
@@ -5764,7 +5854,12 @@
             <p:ph idx="1"/>
           </p:nvPr>
         </p:nvSpPr>
-        <p:spPr/>
+        <p:spPr>
+          <a:xfrm>
+            <a:off x="838200" y="1825625"/>
+            <a:ext cx="10515600" cy="4351338"/>
+          </a:xfrm>
+        </p:spPr>
         <p:txBody>
           <a:bodyPr/>
           <a:lstStyle/>
@@ -5790,7 +5885,7 @@
             <a:endParaRPr lang="pt-PT" dirty="0"/>
           </a:p>
           <a:p>
-            <a:pPr marL="0" indent="0" algn="ctr">
+            <a:pPr marL="0" indent="0">
               <a:buNone/>
             </a:pPr>
             <a:r>
@@ -5815,53 +5910,6 @@
               <a:buNone/>
             </a:pPr>
             <a:endParaRPr lang="pt-PT" dirty="0"/>
-          </a:p>
-          <a:p>
-            <a:pPr marL="0" indent="0" algn="r">
-              <a:buNone/>
-            </a:pPr>
-            <a:r>
-              <a:rPr lang="pt-PT" dirty="0"/>
-              <a:t>http://linkedin.com/in/vascoveloso</a:t>
-            </a:r>
-          </a:p>
-          <a:p>
-            <a:pPr marL="0" indent="0" algn="r">
-              <a:buNone/>
-            </a:pPr>
-            <a:r>
-              <a:rPr lang="pt-PT" dirty="0"/>
-              <a:t>vveloso@gmail.com</a:t>
-            </a:r>
-          </a:p>
-        </p:txBody>
-      </p:sp>
-      <p:sp>
-        <p:nvSpPr>
-          <p:cNvPr id="4" name="Footer Placeholder 3">
-            <a:extLst>
-              <a:ext uri="{FF2B5EF4-FFF2-40B4-BE49-F238E27FC236}">
-                <a16:creationId xmlns:a16="http://schemas.microsoft.com/office/drawing/2014/main" id="{43568767-56E4-493D-8E29-920531FE928A}"/>
-              </a:ext>
-            </a:extLst>
-          </p:cNvPr>
-          <p:cNvSpPr>
-            <a:spLocks noGrp="1"/>
-          </p:cNvSpPr>
-          <p:nvPr>
-            <p:ph type="ftr" sz="quarter" idx="11"/>
-          </p:nvPr>
-        </p:nvSpPr>
-        <p:spPr/>
-        <p:txBody>
-          <a:bodyPr/>
-          <a:lstStyle/>
-          <a:p>
-            <a:r>
-              <a:rPr lang="en-GB"/>
-              <a:t>Privacy and Security in IoT - Pixels Camp 2017</a:t>
-            </a:r>
-            <a:endParaRPr lang="pt-PT"/>
           </a:p>
         </p:txBody>
       </p:sp>
@@ -5891,6 +5939,88 @@
               <a:t>18</a:t>
             </a:fld>
             <a:endParaRPr lang="pt-PT"/>
+          </a:p>
+        </p:txBody>
+      </p:sp>
+      <p:pic>
+        <p:nvPicPr>
+          <p:cNvPr id="4098" name="Picture 2" descr="Sandboxing Cycle">
+            <a:extLst>
+              <a:ext uri="{FF2B5EF4-FFF2-40B4-BE49-F238E27FC236}">
+                <a16:creationId xmlns:a16="http://schemas.microsoft.com/office/drawing/2014/main" id="{FAB49432-1A9B-4BB9-9D33-DF6C3EC3DB53}"/>
+              </a:ext>
+            </a:extLst>
+          </p:cNvPr>
+          <p:cNvPicPr>
+            <a:picLocks noChangeAspect="1" noChangeArrowheads="1"/>
+          </p:cNvPicPr>
+          <p:nvPr/>
+        </p:nvPicPr>
+        <p:blipFill>
+          <a:blip r:embed="rId2">
+            <a:extLst>
+              <a:ext uri="{28A0092B-C50C-407E-A947-70E740481C1C}">
+                <a14:useLocalDpi xmlns:a14="http://schemas.microsoft.com/office/drawing/2010/main" val="0"/>
+              </a:ext>
+            </a:extLst>
+          </a:blip>
+          <a:srcRect/>
+          <a:stretch>
+            <a:fillRect/>
+          </a:stretch>
+        </p:blipFill>
+        <p:spPr bwMode="auto">
+          <a:xfrm>
+            <a:off x="6733592" y="566738"/>
+            <a:ext cx="5181600" cy="5610225"/>
+          </a:xfrm>
+          <a:prstGeom prst="rect">
+            <a:avLst/>
+          </a:prstGeom>
+          <a:noFill/>
+          <a:extLst>
+            <a:ext uri="{909E8E84-426E-40DD-AFC4-6F175D3DCCD1}">
+              <a14:hiddenFill xmlns:a14="http://schemas.microsoft.com/office/drawing/2010/main">
+                <a:solidFill>
+                  <a:srgbClr val="FFFFFF"/>
+                </a:solidFill>
+              </a14:hiddenFill>
+            </a:ext>
+          </a:extLst>
+        </p:spPr>
+      </p:pic>
+      <p:sp>
+        <p:nvSpPr>
+          <p:cNvPr id="7" name="TextBox 6">
+            <a:extLst>
+              <a:ext uri="{FF2B5EF4-FFF2-40B4-BE49-F238E27FC236}">
+                <a16:creationId xmlns:a16="http://schemas.microsoft.com/office/drawing/2014/main" id="{37D97AC5-D036-48E9-A55B-91B2E92D55D1}"/>
+              </a:ext>
+            </a:extLst>
+          </p:cNvPr>
+          <p:cNvSpPr txBox="1"/>
+          <p:nvPr/>
+        </p:nvSpPr>
+        <p:spPr>
+          <a:xfrm>
+            <a:off x="9982200" y="6094740"/>
+            <a:ext cx="1593706" cy="261610"/>
+          </a:xfrm>
+          <a:prstGeom prst="rect">
+            <a:avLst/>
+          </a:prstGeom>
+          <a:noFill/>
+        </p:spPr>
+        <p:txBody>
+          <a:bodyPr wrap="none" rtlCol="0">
+            <a:spAutoFit/>
+          </a:bodyPr>
+          <a:lstStyle/>
+          <a:p>
+            <a:r>
+              <a:rPr lang="pt-PT" sz="1100" dirty="0"/>
+              <a:t>https://xkcd.com/2044/</a:t>
+            </a:r>
           </a:p>
         </p:txBody>
       </p:sp>
@@ -6032,8 +6162,60 @@
           </a:p>
           <a:p>
             <a:r>
-              <a:rPr lang="pt-PT" dirty="0"/>
-              <a:t>Currently a Java software architect at Coriant Portugal.</a:t>
+              <a:rPr lang="pt-PT" dirty="0" err="1"/>
+              <a:t>Currently</a:t>
+            </a:r>
+            <a:r>
+              <a:rPr lang="pt-PT" dirty="0"/>
+              <a:t> </a:t>
+            </a:r>
+            <a:r>
+              <a:rPr lang="pt-PT" dirty="0" err="1"/>
+              <a:t>writing</a:t>
+            </a:r>
+            <a:r>
+              <a:rPr lang="pt-PT" dirty="0"/>
+              <a:t> </a:t>
+            </a:r>
+            <a:r>
+              <a:rPr lang="pt-PT" dirty="0" err="1"/>
+              <a:t>and</a:t>
+            </a:r>
+            <a:r>
+              <a:rPr lang="pt-PT" dirty="0"/>
+              <a:t> </a:t>
+            </a:r>
+            <a:r>
+              <a:rPr lang="pt-PT" dirty="0" err="1"/>
+              <a:t>designing</a:t>
+            </a:r>
+            <a:r>
+              <a:rPr lang="pt-PT" dirty="0"/>
+              <a:t> Java software </a:t>
+            </a:r>
+            <a:r>
+              <a:rPr lang="pt-PT" dirty="0" err="1"/>
+              <a:t>with</a:t>
+            </a:r>
+            <a:r>
+              <a:rPr lang="pt-PT" dirty="0"/>
+              <a:t> </a:t>
+            </a:r>
+            <a:r>
+              <a:rPr lang="pt-PT" dirty="0" err="1"/>
+              <a:t>Code</a:t>
+            </a:r>
+            <a:r>
+              <a:rPr lang="pt-PT" dirty="0"/>
+              <a:t> </a:t>
+            </a:r>
+            <a:r>
+              <a:rPr lang="pt-PT" dirty="0" err="1"/>
+              <a:t>Nomads</a:t>
+            </a:r>
+            <a:r>
+              <a:rPr lang="pt-PT" dirty="0"/>
+              <a:t>.</a:t>
             </a:r>
           </a:p>
         </p:txBody>
@@ -6083,12 +6265,41 @@
           </a:extLst>
         </p:spPr>
       </p:pic>
+      <p:sp>
+        <p:nvSpPr>
+          <p:cNvPr id="5" name="Slide Number Placeholder 4">
+            <a:extLst>
+              <a:ext uri="{FF2B5EF4-FFF2-40B4-BE49-F238E27FC236}">
+                <a16:creationId xmlns:a16="http://schemas.microsoft.com/office/drawing/2014/main" id="{CA9A95C8-BC2F-4C74-9B14-9EB52CCB9F2A}"/>
+              </a:ext>
+            </a:extLst>
+          </p:cNvPr>
+          <p:cNvSpPr>
+            <a:spLocks noGrp="1"/>
+          </p:cNvSpPr>
+          <p:nvPr>
+            <p:ph type="sldNum" sz="quarter" idx="12"/>
+          </p:nvPr>
+        </p:nvSpPr>
+        <p:spPr/>
+        <p:txBody>
+          <a:bodyPr/>
+          <a:lstStyle/>
+          <a:p>
+            <a:fld id="{7E15FEC1-A5E5-4B2D-852F-39C7163B3C5C}" type="slidenum">
+              <a:rPr lang="pt-PT" smtClean="0"/>
+              <a:t>2</a:t>
+            </a:fld>
+            <a:endParaRPr lang="pt-PT"/>
+          </a:p>
+        </p:txBody>
+      </p:sp>
       <p:pic>
         <p:nvPicPr>
-          <p:cNvPr id="1034" name="Picture 10" descr="Resultado de imagem para coriant logo">
-            <a:extLst>
-              <a:ext uri="{FF2B5EF4-FFF2-40B4-BE49-F238E27FC236}">
-                <a16:creationId xmlns:a16="http://schemas.microsoft.com/office/drawing/2014/main" id="{841E5D57-F7B4-45E8-9CB3-6315D056DC34}"/>
+          <p:cNvPr id="1026" name="Picture 2" descr="https://www.codenomads.nl/wp-content/uploads/Code-Nomads_liggend.png">
+            <a:extLst>
+              <a:ext uri="{FF2B5EF4-FFF2-40B4-BE49-F238E27FC236}">
+                <a16:creationId xmlns:a16="http://schemas.microsoft.com/office/drawing/2014/main" id="{0C116521-F22E-4CE8-A1C2-B16D038A449B}"/>
               </a:ext>
             </a:extLst>
           </p:cNvPr>
@@ -6112,8 +6323,8 @@
         </p:blipFill>
         <p:spPr bwMode="auto">
           <a:xfrm>
-            <a:off x="9329056" y="5294489"/>
-            <a:ext cx="2106988" cy="717550"/>
+            <a:off x="6769430" y="3542857"/>
+            <a:ext cx="4584370" cy="916874"/>
           </a:xfrm>
           <a:prstGeom prst="rect">
             <a:avLst/>
@@ -6130,64 +6341,6 @@
           </a:extLst>
         </p:spPr>
       </p:pic>
-      <p:sp>
-        <p:nvSpPr>
-          <p:cNvPr id="4" name="Footer Placeholder 3">
-            <a:extLst>
-              <a:ext uri="{FF2B5EF4-FFF2-40B4-BE49-F238E27FC236}">
-                <a16:creationId xmlns:a16="http://schemas.microsoft.com/office/drawing/2014/main" id="{0FDE2151-C174-400D-A536-024B069A99DA}"/>
-              </a:ext>
-            </a:extLst>
-          </p:cNvPr>
-          <p:cNvSpPr>
-            <a:spLocks noGrp="1"/>
-          </p:cNvSpPr>
-          <p:nvPr>
-            <p:ph type="ftr" sz="quarter" idx="11"/>
-          </p:nvPr>
-        </p:nvSpPr>
-        <p:spPr/>
-        <p:txBody>
-          <a:bodyPr/>
-          <a:lstStyle/>
-          <a:p>
-            <a:r>
-              <a:rPr lang="en-GB"/>
-              <a:t>Privacy and Security in IoT - Pixels Camp 2017</a:t>
-            </a:r>
-            <a:endParaRPr lang="pt-PT"/>
-          </a:p>
-        </p:txBody>
-      </p:sp>
-      <p:sp>
-        <p:nvSpPr>
-          <p:cNvPr id="5" name="Slide Number Placeholder 4">
-            <a:extLst>
-              <a:ext uri="{FF2B5EF4-FFF2-40B4-BE49-F238E27FC236}">
-                <a16:creationId xmlns:a16="http://schemas.microsoft.com/office/drawing/2014/main" id="{CA9A95C8-BC2F-4C74-9B14-9EB52CCB9F2A}"/>
-              </a:ext>
-            </a:extLst>
-          </p:cNvPr>
-          <p:cNvSpPr>
-            <a:spLocks noGrp="1"/>
-          </p:cNvSpPr>
-          <p:nvPr>
-            <p:ph type="sldNum" sz="quarter" idx="12"/>
-          </p:nvPr>
-        </p:nvSpPr>
-        <p:spPr/>
-        <p:txBody>
-          <a:bodyPr/>
-          <a:lstStyle/>
-          <a:p>
-            <a:fld id="{7E15FEC1-A5E5-4B2D-852F-39C7163B3C5C}" type="slidenum">
-              <a:rPr lang="pt-PT" smtClean="0"/>
-              <a:t>2</a:t>
-            </a:fld>
-            <a:endParaRPr lang="pt-PT"/>
-          </a:p>
-        </p:txBody>
-      </p:sp>
     </p:spTree>
     <p:extLst>
       <p:ext uri="{BB962C8B-B14F-4D97-AF65-F5344CB8AC3E}">
@@ -6303,35 +6456,6 @@
       </p:sp>
       <p:sp>
         <p:nvSpPr>
-          <p:cNvPr id="4" name="Footer Placeholder 3">
-            <a:extLst>
-              <a:ext uri="{FF2B5EF4-FFF2-40B4-BE49-F238E27FC236}">
-                <a16:creationId xmlns:a16="http://schemas.microsoft.com/office/drawing/2014/main" id="{DAE02CB1-7EB9-412D-9121-9B66A51FCDED}"/>
-              </a:ext>
-            </a:extLst>
-          </p:cNvPr>
-          <p:cNvSpPr>
-            <a:spLocks noGrp="1"/>
-          </p:cNvSpPr>
-          <p:nvPr>
-            <p:ph type="ftr" sz="quarter" idx="11"/>
-          </p:nvPr>
-        </p:nvSpPr>
-        <p:spPr/>
-        <p:txBody>
-          <a:bodyPr/>
-          <a:lstStyle/>
-          <a:p>
-            <a:r>
-              <a:rPr lang="en-GB"/>
-              <a:t>Privacy and Security in IoT - Pixels Camp 2017</a:t>
-            </a:r>
-            <a:endParaRPr lang="pt-PT"/>
-          </a:p>
-        </p:txBody>
-      </p:sp>
-      <p:sp>
-        <p:nvSpPr>
           <p:cNvPr id="5" name="Slide Number Placeholder 4">
             <a:extLst>
               <a:ext uri="{FF2B5EF4-FFF2-40B4-BE49-F238E27FC236}">
@@ -6501,35 +6625,6 @@
       </p:sp>
       <p:sp>
         <p:nvSpPr>
-          <p:cNvPr id="4" name="Footer Placeholder 3">
-            <a:extLst>
-              <a:ext uri="{FF2B5EF4-FFF2-40B4-BE49-F238E27FC236}">
-                <a16:creationId xmlns:a16="http://schemas.microsoft.com/office/drawing/2014/main" id="{67406D01-21EB-41AE-9A5B-2A66CE977B15}"/>
-              </a:ext>
-            </a:extLst>
-          </p:cNvPr>
-          <p:cNvSpPr>
-            <a:spLocks noGrp="1"/>
-          </p:cNvSpPr>
-          <p:nvPr>
-            <p:ph type="ftr" sz="quarter" idx="11"/>
-          </p:nvPr>
-        </p:nvSpPr>
-        <p:spPr/>
-        <p:txBody>
-          <a:bodyPr/>
-          <a:lstStyle/>
-          <a:p>
-            <a:r>
-              <a:rPr lang="en-GB"/>
-              <a:t>Privacy and Security in IoT - Pixels Camp 2017</a:t>
-            </a:r>
-            <a:endParaRPr lang="pt-PT"/>
-          </a:p>
-        </p:txBody>
-      </p:sp>
-      <p:sp>
-        <p:nvSpPr>
           <p:cNvPr id="5" name="Slide Number Placeholder 4">
             <a:extLst>
               <a:ext uri="{FF2B5EF4-FFF2-40B4-BE49-F238E27FC236}">
@@ -6697,35 +6792,6 @@
       </p:sp>
       <p:sp>
         <p:nvSpPr>
-          <p:cNvPr id="4" name="Footer Placeholder 3">
-            <a:extLst>
-              <a:ext uri="{FF2B5EF4-FFF2-40B4-BE49-F238E27FC236}">
-                <a16:creationId xmlns:a16="http://schemas.microsoft.com/office/drawing/2014/main" id="{6B6AB697-5859-4C07-BC27-DB59309ECCA9}"/>
-              </a:ext>
-            </a:extLst>
-          </p:cNvPr>
-          <p:cNvSpPr>
-            <a:spLocks noGrp="1"/>
-          </p:cNvSpPr>
-          <p:nvPr>
-            <p:ph type="ftr" sz="quarter" idx="11"/>
-          </p:nvPr>
-        </p:nvSpPr>
-        <p:spPr/>
-        <p:txBody>
-          <a:bodyPr/>
-          <a:lstStyle/>
-          <a:p>
-            <a:r>
-              <a:rPr lang="en-GB"/>
-              <a:t>Privacy and Security in IoT - Pixels Camp 2017</a:t>
-            </a:r>
-            <a:endParaRPr lang="pt-PT"/>
-          </a:p>
-        </p:txBody>
-      </p:sp>
-      <p:sp>
-        <p:nvSpPr>
           <p:cNvPr id="5" name="Slide Number Placeholder 4">
             <a:extLst>
               <a:ext uri="{FF2B5EF4-FFF2-40B4-BE49-F238E27FC236}">
@@ -6901,35 +6967,6 @@
       </p:sp>
       <p:sp>
         <p:nvSpPr>
-          <p:cNvPr id="4" name="Footer Placeholder 3">
-            <a:extLst>
-              <a:ext uri="{FF2B5EF4-FFF2-40B4-BE49-F238E27FC236}">
-                <a16:creationId xmlns:a16="http://schemas.microsoft.com/office/drawing/2014/main" id="{CC17CF87-8DBD-4584-86F7-8A6AE73479AC}"/>
-              </a:ext>
-            </a:extLst>
-          </p:cNvPr>
-          <p:cNvSpPr>
-            <a:spLocks noGrp="1"/>
-          </p:cNvSpPr>
-          <p:nvPr>
-            <p:ph type="ftr" sz="quarter" idx="11"/>
-          </p:nvPr>
-        </p:nvSpPr>
-        <p:spPr/>
-        <p:txBody>
-          <a:bodyPr/>
-          <a:lstStyle/>
-          <a:p>
-            <a:r>
-              <a:rPr lang="en-GB"/>
-              <a:t>Privacy and Security in IoT - Pixels Camp 2017</a:t>
-            </a:r>
-            <a:endParaRPr lang="pt-PT"/>
-          </a:p>
-        </p:txBody>
-      </p:sp>
-      <p:sp>
-        <p:nvSpPr>
           <p:cNvPr id="5" name="Slide Number Placeholder 4">
             <a:extLst>
               <a:ext uri="{FF2B5EF4-FFF2-40B4-BE49-F238E27FC236}">
@@ -7089,38 +7126,29 @@
           </a:p>
           <a:p>
             <a:r>
-              <a:rPr lang="pt-PT" dirty="0"/>
-              <a:t>Pair external devices, such as phones, securely to NFC/Bluetooth.</a:t>
-            </a:r>
-          </a:p>
-        </p:txBody>
-      </p:sp>
-      <p:sp>
-        <p:nvSpPr>
-          <p:cNvPr id="4" name="Footer Placeholder 3">
-            <a:extLst>
-              <a:ext uri="{FF2B5EF4-FFF2-40B4-BE49-F238E27FC236}">
-                <a16:creationId xmlns:a16="http://schemas.microsoft.com/office/drawing/2014/main" id="{9856D07E-6F19-461F-A9FD-999F7E46868A}"/>
-              </a:ext>
-            </a:extLst>
-          </p:cNvPr>
-          <p:cNvSpPr>
-            <a:spLocks noGrp="1"/>
-          </p:cNvSpPr>
-          <p:nvPr>
-            <p:ph type="ftr" sz="quarter" idx="11"/>
-          </p:nvPr>
-        </p:nvSpPr>
-        <p:spPr/>
-        <p:txBody>
-          <a:bodyPr/>
-          <a:lstStyle/>
-          <a:p>
-            <a:r>
-              <a:rPr lang="en-GB"/>
-              <a:t>Privacy and Security in IoT - Pixels Camp 2017</a:t>
-            </a:r>
-            <a:endParaRPr lang="pt-PT"/>
+              <a:rPr lang="pt-PT" dirty="0" err="1"/>
+              <a:t>Pair</a:t>
+            </a:r>
+            <a:r>
+              <a:rPr lang="pt-PT" dirty="0"/>
+              <a:t> external devices, such as phones, </a:t>
+            </a:r>
+            <a:r>
+              <a:rPr lang="pt-PT" dirty="0" err="1"/>
+              <a:t>securely</a:t>
+            </a:r>
+            <a:r>
+              <a:rPr lang="pt-PT" dirty="0"/>
+              <a:t> (e.g. </a:t>
+            </a:r>
+            <a:r>
+              <a:rPr lang="pt-PT"/>
+              <a:t>secure NFC</a:t>
+            </a:r>
+            <a:r>
+              <a:rPr lang="pt-PT" dirty="0"/>
+              <a:t>/Bluetooth).</a:t>
+            </a:r>
           </a:p>
         </p:txBody>
       </p:sp>
@@ -7297,35 +7325,6 @@
       </p:sp>
       <p:sp>
         <p:nvSpPr>
-          <p:cNvPr id="4" name="Footer Placeholder 3">
-            <a:extLst>
-              <a:ext uri="{FF2B5EF4-FFF2-40B4-BE49-F238E27FC236}">
-                <a16:creationId xmlns:a16="http://schemas.microsoft.com/office/drawing/2014/main" id="{51B3518B-083C-4EAE-A5E1-3FA34D6A1195}"/>
-              </a:ext>
-            </a:extLst>
-          </p:cNvPr>
-          <p:cNvSpPr>
-            <a:spLocks noGrp="1"/>
-          </p:cNvSpPr>
-          <p:nvPr>
-            <p:ph type="ftr" sz="quarter" idx="11"/>
-          </p:nvPr>
-        </p:nvSpPr>
-        <p:spPr/>
-        <p:txBody>
-          <a:bodyPr/>
-          <a:lstStyle/>
-          <a:p>
-            <a:r>
-              <a:rPr lang="en-GB"/>
-              <a:t>Privacy and Security in IoT - Pixels Camp 2017</a:t>
-            </a:r>
-            <a:endParaRPr lang="pt-PT"/>
-          </a:p>
-        </p:txBody>
-      </p:sp>
-      <p:sp>
-        <p:nvSpPr>
           <p:cNvPr id="5" name="Slide Number Placeholder 4">
             <a:extLst>
               <a:ext uri="{FF2B5EF4-FFF2-40B4-BE49-F238E27FC236}">
@@ -7495,35 +7494,6 @@
           <a:p>
             <a:pPr lvl="1"/>
             <a:endParaRPr lang="pt-PT" dirty="0"/>
-          </a:p>
-        </p:txBody>
-      </p:sp>
-      <p:sp>
-        <p:nvSpPr>
-          <p:cNvPr id="4" name="Footer Placeholder 3">
-            <a:extLst>
-              <a:ext uri="{FF2B5EF4-FFF2-40B4-BE49-F238E27FC236}">
-                <a16:creationId xmlns:a16="http://schemas.microsoft.com/office/drawing/2014/main" id="{3BF95E85-3A04-4276-8CE7-C505A24B7384}"/>
-              </a:ext>
-            </a:extLst>
-          </p:cNvPr>
-          <p:cNvSpPr>
-            <a:spLocks noGrp="1"/>
-          </p:cNvSpPr>
-          <p:nvPr>
-            <p:ph type="ftr" sz="quarter" idx="11"/>
-          </p:nvPr>
-        </p:nvSpPr>
-        <p:spPr/>
-        <p:txBody>
-          <a:bodyPr/>
-          <a:lstStyle/>
-          <a:p>
-            <a:r>
-              <a:rPr lang="en-GB"/>
-              <a:t>Privacy and Security in IoT - Pixels Camp 2017</a:t>
-            </a:r>
-            <a:endParaRPr lang="pt-PT"/>
           </a:p>
         </p:txBody>
       </p:sp>

</xml_diff>